<commit_message>
rough first draft of index lectures
</commit_message>
<xml_diff>
--- a/assets/lectures/cbw-cshl/2019/mini/RNASeq_MiniLecture_07_Indexing.pptx
+++ b/assets/lectures/cbw-cshl/2019/mini/RNASeq_MiniLecture_07_Indexing.pptx
@@ -5,10 +5,12 @@
     <p:sldMasterId id="2147483660" r:id="rId1"/>
   </p:sldMasterIdLst>
   <p:notesMasterIdLst>
-    <p:notesMasterId r:id="rId3"/>
+    <p:notesMasterId r:id="rId5"/>
   </p:notesMasterIdLst>
   <p:sldIdLst>
     <p:sldId id="259" r:id="rId2"/>
+    <p:sldId id="260" r:id="rId3"/>
+    <p:sldId id="261" r:id="rId4"/>
   </p:sldIdLst>
   <p:sldSz cx="12192000" cy="6858000"/>
   <p:notesSz cx="6858000" cy="9144000"/>
@@ -4398,6 +4400,806 @@
     <p:extLst>
       <p:ext uri="{BB962C8B-B14F-4D97-AF65-F5344CB8AC3E}">
         <p14:creationId xmlns:p14="http://schemas.microsoft.com/office/powerpoint/2010/main" val="1702947648"/>
+      </p:ext>
+    </p:extLst>
+  </p:cSld>
+  <p:clrMapOvr>
+    <a:masterClrMapping/>
+  </p:clrMapOvr>
+</p:sld>
+</file>
+
+<file path=ppt/slides/slide2.xml><?xml version="1.0" encoding="utf-8"?>
+<p:sld xmlns:a="http://schemas.openxmlformats.org/drawingml/2006/main" xmlns:r="http://schemas.openxmlformats.org/officeDocument/2006/relationships" xmlns:p="http://schemas.openxmlformats.org/presentationml/2006/main">
+  <p:cSld>
+    <p:spTree>
+      <p:nvGrpSpPr>
+        <p:cNvPr id="1" name=""/>
+        <p:cNvGrpSpPr/>
+        <p:nvPr/>
+      </p:nvGrpSpPr>
+      <p:grpSpPr>
+        <a:xfrm>
+          <a:off x="0" y="0"/>
+          <a:ext cx="0" cy="0"/>
+          <a:chOff x="0" y="0"/>
+          <a:chExt cx="0" cy="0"/>
+        </a:xfrm>
+      </p:grpSpPr>
+      <p:sp>
+        <p:nvSpPr>
+          <p:cNvPr id="2" name="Title 1">
+            <a:extLst>
+              <a:ext uri="{FF2B5EF4-FFF2-40B4-BE49-F238E27FC236}">
+                <a16:creationId xmlns:a16="http://schemas.microsoft.com/office/drawing/2014/main" id="{02BF5CD1-D1CD-EC4E-BC30-B25D3CB8C977}"/>
+              </a:ext>
+            </a:extLst>
+          </p:cNvPr>
+          <p:cNvSpPr>
+            <a:spLocks noGrp="1"/>
+          </p:cNvSpPr>
+          <p:nvPr>
+            <p:ph type="title"/>
+          </p:nvPr>
+        </p:nvSpPr>
+        <p:spPr>
+          <a:xfrm>
+            <a:off x="838200" y="102366"/>
+            <a:ext cx="10515600" cy="780503"/>
+          </a:xfrm>
+        </p:spPr>
+        <p:txBody>
+          <a:bodyPr>
+            <a:normAutofit/>
+          </a:bodyPr>
+          <a:lstStyle/>
+          <a:p>
+            <a:r>
+              <a:rPr lang="en-US" sz="4000" dirty="0">
+                <a:latin typeface="Calibri" panose="020F0502020204030204" pitchFamily="34" charset="0"/>
+                <a:cs typeface="Calibri" panose="020F0502020204030204" pitchFamily="34" charset="0"/>
+              </a:rPr>
+              <a:t>Indexing allows rapid access in massive files</a:t>
+            </a:r>
+          </a:p>
+        </p:txBody>
+      </p:sp>
+      <p:sp>
+        <p:nvSpPr>
+          <p:cNvPr id="3" name="Content Placeholder 2">
+            <a:extLst>
+              <a:ext uri="{FF2B5EF4-FFF2-40B4-BE49-F238E27FC236}">
+                <a16:creationId xmlns:a16="http://schemas.microsoft.com/office/drawing/2014/main" id="{38FC07D5-B6CF-AF47-8871-5111BE13BD39}"/>
+              </a:ext>
+            </a:extLst>
+          </p:cNvPr>
+          <p:cNvSpPr>
+            <a:spLocks noGrp="1"/>
+          </p:cNvSpPr>
+          <p:nvPr>
+            <p:ph idx="1"/>
+          </p:nvPr>
+        </p:nvSpPr>
+        <p:spPr>
+          <a:xfrm>
+            <a:off x="838200" y="956441"/>
+            <a:ext cx="10515600" cy="5220522"/>
+          </a:xfrm>
+        </p:spPr>
+        <p:txBody>
+          <a:bodyPr>
+            <a:normAutofit fontScale="85000" lnSpcReduction="10000"/>
+          </a:bodyPr>
+          <a:lstStyle/>
+          <a:p>
+            <a:r>
+              <a:rPr lang="en-US" dirty="0">
+                <a:latin typeface="Calibri" panose="020F0502020204030204" pitchFamily="34" charset="0"/>
+                <a:cs typeface="Calibri" panose="020F0502020204030204" pitchFamily="34" charset="0"/>
+              </a:rPr>
+              <a:t>A recurring theme in genome analysis is the need to index files</a:t>
+            </a:r>
+          </a:p>
+          <a:p>
+            <a:r>
+              <a:rPr lang="en-US" dirty="0">
+                <a:latin typeface="Calibri" panose="020F0502020204030204" pitchFamily="34" charset="0"/>
+                <a:cs typeface="Calibri" panose="020F0502020204030204" pitchFamily="34" charset="0"/>
+              </a:rPr>
+              <a:t>Indexing builds a kind of table-of-contents so that a specific position in a (sorted) file can be jumped to directly, rather than having to read/scan through the entire file to find that position</a:t>
+            </a:r>
+          </a:p>
+          <a:p>
+            <a:r>
+              <a:rPr lang="en-US" dirty="0">
+                <a:latin typeface="Calibri" panose="020F0502020204030204" pitchFamily="34" charset="0"/>
+                <a:cs typeface="Calibri" panose="020F0502020204030204" pitchFamily="34" charset="0"/>
+              </a:rPr>
+              <a:t>Indexing may require significant compute/time but typically only occurs once</a:t>
+            </a:r>
+          </a:p>
+          <a:p>
+            <a:r>
+              <a:rPr lang="en-US" dirty="0">
+                <a:latin typeface="Calibri" panose="020F0502020204030204" pitchFamily="34" charset="0"/>
+                <a:cs typeface="Calibri" panose="020F0502020204030204" pitchFamily="34" charset="0"/>
+              </a:rPr>
+              <a:t>Each application may require a different indexing strategy</a:t>
+            </a:r>
+          </a:p>
+          <a:p>
+            <a:r>
+              <a:rPr lang="en-US" dirty="0">
+                <a:latin typeface="Calibri" panose="020F0502020204030204" pitchFamily="34" charset="0"/>
+                <a:cs typeface="Calibri" panose="020F0502020204030204" pitchFamily="34" charset="0"/>
+              </a:rPr>
+              <a:t>Just a few examples include:</a:t>
+            </a:r>
+          </a:p>
+          <a:p>
+            <a:pPr lvl="1"/>
+            <a:r>
+              <a:rPr lang="en-US" dirty="0">
+                <a:latin typeface="Calibri" panose="020F0502020204030204" pitchFamily="34" charset="0"/>
+                <a:cs typeface="Calibri" panose="020F0502020204030204" pitchFamily="34" charset="0"/>
+              </a:rPr>
+              <a:t>Index a </a:t>
+            </a:r>
+            <a:r>
+              <a:rPr lang="en-US" dirty="0" err="1">
+                <a:latin typeface="Calibri" panose="020F0502020204030204" pitchFamily="34" charset="0"/>
+                <a:cs typeface="Calibri" panose="020F0502020204030204" pitchFamily="34" charset="0"/>
+              </a:rPr>
+              <a:t>reference.fasta</a:t>
+            </a:r>
+            <a:r>
+              <a:rPr lang="en-US" dirty="0">
+                <a:latin typeface="Calibri" panose="020F0502020204030204" pitchFamily="34" charset="0"/>
+                <a:cs typeface="Calibri" panose="020F0502020204030204" pitchFamily="34" charset="0"/>
+              </a:rPr>
+              <a:t> file (e.g., with bwa index) for use with aligners (e.g., bwa mem)</a:t>
+            </a:r>
+          </a:p>
+          <a:p>
+            <a:pPr lvl="1"/>
+            <a:r>
+              <a:rPr lang="en-US" dirty="0">
+                <a:latin typeface="Calibri" panose="020F0502020204030204" pitchFamily="34" charset="0"/>
+                <a:cs typeface="Calibri" panose="020F0502020204030204" pitchFamily="34" charset="0"/>
+              </a:rPr>
+              <a:t>Index a </a:t>
+            </a:r>
+            <a:r>
+              <a:rPr lang="en-US" dirty="0" err="1">
+                <a:latin typeface="Calibri" panose="020F0502020204030204" pitchFamily="34" charset="0"/>
+                <a:cs typeface="Calibri" panose="020F0502020204030204" pitchFamily="34" charset="0"/>
+              </a:rPr>
+              <a:t>sequence.bam</a:t>
+            </a:r>
+            <a:r>
+              <a:rPr lang="en-US" dirty="0">
+                <a:latin typeface="Calibri" panose="020F0502020204030204" pitchFamily="34" charset="0"/>
+                <a:cs typeface="Calibri" panose="020F0502020204030204" pitchFamily="34" charset="0"/>
+              </a:rPr>
+              <a:t> file (e.g., with </a:t>
+            </a:r>
+            <a:r>
+              <a:rPr lang="en-US" dirty="0" err="1">
+                <a:latin typeface="Calibri" panose="020F0502020204030204" pitchFamily="34" charset="0"/>
+                <a:cs typeface="Calibri" panose="020F0502020204030204" pitchFamily="34" charset="0"/>
+              </a:rPr>
+              <a:t>samtools</a:t>
+            </a:r>
+            <a:r>
+              <a:rPr lang="en-US" dirty="0">
+                <a:latin typeface="Calibri" panose="020F0502020204030204" pitchFamily="34" charset="0"/>
+                <a:cs typeface="Calibri" panose="020F0502020204030204" pitchFamily="34" charset="0"/>
+              </a:rPr>
+              <a:t> index, </a:t>
+            </a:r>
+            <a:r>
+              <a:rPr lang="en-US" dirty="0" err="1">
+                <a:latin typeface="Calibri" panose="020F0502020204030204" pitchFamily="34" charset="0"/>
+                <a:cs typeface="Calibri" panose="020F0502020204030204" pitchFamily="34" charset="0"/>
+              </a:rPr>
+              <a:t>picard</a:t>
+            </a:r>
+            <a:r>
+              <a:rPr lang="en-US" dirty="0">
+                <a:latin typeface="Calibri" panose="020F0502020204030204" pitchFamily="34" charset="0"/>
+                <a:cs typeface="Calibri" panose="020F0502020204030204" pitchFamily="34" charset="0"/>
+              </a:rPr>
+              <a:t>, </a:t>
+            </a:r>
+            <a:r>
+              <a:rPr lang="en-US" dirty="0" err="1">
+                <a:latin typeface="Calibri" panose="020F0502020204030204" pitchFamily="34" charset="0"/>
+                <a:cs typeface="Calibri" panose="020F0502020204030204" pitchFamily="34" charset="0"/>
+              </a:rPr>
+              <a:t>etc</a:t>
+            </a:r>
+            <a:r>
+              <a:rPr lang="en-US" dirty="0">
+                <a:latin typeface="Calibri" panose="020F0502020204030204" pitchFamily="34" charset="0"/>
+                <a:cs typeface="Calibri" panose="020F0502020204030204" pitchFamily="34" charset="0"/>
+              </a:rPr>
+              <a:t>) for use with IGV and other applications</a:t>
+            </a:r>
+          </a:p>
+          <a:p>
+            <a:pPr lvl="1"/>
+            <a:r>
+              <a:rPr lang="en-US" dirty="0">
+                <a:latin typeface="Calibri" panose="020F0502020204030204" pitchFamily="34" charset="0"/>
+                <a:cs typeface="Calibri" panose="020F0502020204030204" pitchFamily="34" charset="0"/>
+              </a:rPr>
+              <a:t>Index a </a:t>
+            </a:r>
+            <a:r>
+              <a:rPr lang="en-US" dirty="0" err="1">
+                <a:latin typeface="Calibri" panose="020F0502020204030204" pitchFamily="34" charset="0"/>
+                <a:cs typeface="Calibri" panose="020F0502020204030204" pitchFamily="34" charset="0"/>
+              </a:rPr>
+              <a:t>reference.fasta</a:t>
+            </a:r>
+            <a:r>
+              <a:rPr lang="en-US" dirty="0">
+                <a:latin typeface="Calibri" panose="020F0502020204030204" pitchFamily="34" charset="0"/>
+                <a:cs typeface="Calibri" panose="020F0502020204030204" pitchFamily="34" charset="0"/>
+              </a:rPr>
+              <a:t> file (e.g., with hisat2-build) for use with a splice-aware aligner (e.g., HISAT2)</a:t>
+            </a:r>
+          </a:p>
+          <a:p>
+            <a:pPr lvl="1"/>
+            <a:r>
+              <a:rPr lang="en-US" dirty="0">
+                <a:latin typeface="Calibri" panose="020F0502020204030204" pitchFamily="34" charset="0"/>
+                <a:cs typeface="Calibri" panose="020F0502020204030204" pitchFamily="34" charset="0"/>
+              </a:rPr>
+              <a:t>Index a VCF file (e.g., with GATK </a:t>
+            </a:r>
+            <a:r>
+              <a:rPr lang="en-US" dirty="0" err="1">
+                <a:latin typeface="Calibri" panose="020F0502020204030204" pitchFamily="34" charset="0"/>
+                <a:cs typeface="Calibri" panose="020F0502020204030204" pitchFamily="34" charset="0"/>
+              </a:rPr>
+              <a:t>IndexFeatureFile</a:t>
+            </a:r>
+            <a:r>
+              <a:rPr lang="en-US" dirty="0">
+                <a:latin typeface="Calibri" panose="020F0502020204030204" pitchFamily="34" charset="0"/>
+                <a:cs typeface="Calibri" panose="020F0502020204030204" pitchFamily="34" charset="0"/>
+              </a:rPr>
+              <a:t>) for use with variant filtering software </a:t>
+            </a:r>
+          </a:p>
+          <a:p>
+            <a:pPr lvl="1"/>
+            <a:r>
+              <a:rPr lang="en-US" dirty="0">
+                <a:latin typeface="Calibri" panose="020F0502020204030204" pitchFamily="34" charset="0"/>
+                <a:cs typeface="Calibri" panose="020F0502020204030204" pitchFamily="34" charset="0"/>
+              </a:rPr>
+              <a:t>Many more…</a:t>
+            </a:r>
+          </a:p>
+        </p:txBody>
+      </p:sp>
+    </p:spTree>
+    <p:extLst>
+      <p:ext uri="{BB962C8B-B14F-4D97-AF65-F5344CB8AC3E}">
+        <p14:creationId xmlns:p14="http://schemas.microsoft.com/office/powerpoint/2010/main" val="1833051566"/>
+      </p:ext>
+    </p:extLst>
+  </p:cSld>
+  <p:clrMapOvr>
+    <a:masterClrMapping/>
+  </p:clrMapOvr>
+</p:sld>
+</file>
+
+<file path=ppt/slides/slide3.xml><?xml version="1.0" encoding="utf-8"?>
+<p:sld xmlns:a="http://schemas.openxmlformats.org/drawingml/2006/main" xmlns:r="http://schemas.openxmlformats.org/officeDocument/2006/relationships" xmlns:p="http://schemas.openxmlformats.org/presentationml/2006/main">
+  <p:cSld>
+    <p:spTree>
+      <p:nvGrpSpPr>
+        <p:cNvPr id="1" name=""/>
+        <p:cNvGrpSpPr/>
+        <p:nvPr/>
+      </p:nvGrpSpPr>
+      <p:grpSpPr>
+        <a:xfrm>
+          <a:off x="0" y="0"/>
+          <a:ext cx="0" cy="0"/>
+          <a:chOff x="0" y="0"/>
+          <a:chExt cx="0" cy="0"/>
+        </a:xfrm>
+      </p:grpSpPr>
+      <p:sp>
+        <p:nvSpPr>
+          <p:cNvPr id="2" name="Title 1">
+            <a:extLst>
+              <a:ext uri="{FF2B5EF4-FFF2-40B4-BE49-F238E27FC236}">
+                <a16:creationId xmlns:a16="http://schemas.microsoft.com/office/drawing/2014/main" id="{FBADFF81-2258-C341-84B1-4D4962CB58B6}"/>
+              </a:ext>
+            </a:extLst>
+          </p:cNvPr>
+          <p:cNvSpPr>
+            <a:spLocks noGrp="1"/>
+          </p:cNvSpPr>
+          <p:nvPr>
+            <p:ph type="title"/>
+          </p:nvPr>
+        </p:nvSpPr>
+        <p:spPr>
+          <a:xfrm>
+            <a:off x="838200" y="91858"/>
+            <a:ext cx="10515600" cy="738461"/>
+          </a:xfrm>
+        </p:spPr>
+        <p:txBody>
+          <a:bodyPr>
+            <a:normAutofit fontScale="90000"/>
+          </a:bodyPr>
+          <a:lstStyle/>
+          <a:p>
+            <a:r>
+              <a:rPr lang="en-US" dirty="0">
+                <a:latin typeface="Calibri" panose="020F0502020204030204" pitchFamily="34" charset="0"/>
+                <a:cs typeface="Calibri" panose="020F0502020204030204" pitchFamily="34" charset="0"/>
+              </a:rPr>
+              <a:t>Example index applications and associated files</a:t>
+            </a:r>
+          </a:p>
+        </p:txBody>
+      </p:sp>
+      <p:graphicFrame>
+        <p:nvGraphicFramePr>
+          <p:cNvPr id="5" name="Content Placeholder 4">
+            <a:extLst>
+              <a:ext uri="{FF2B5EF4-FFF2-40B4-BE49-F238E27FC236}">
+                <a16:creationId xmlns:a16="http://schemas.microsoft.com/office/drawing/2014/main" id="{07D03205-10EA-AE44-8715-19387B72486F}"/>
+              </a:ext>
+            </a:extLst>
+          </p:cNvPr>
+          <p:cNvGraphicFramePr>
+            <a:graphicFrameLocks noGrp="1"/>
+          </p:cNvGraphicFramePr>
+          <p:nvPr>
+            <p:ph idx="1"/>
+            <p:extLst>
+              <p:ext uri="{D42A27DB-BD31-4B8C-83A1-F6EECF244321}">
+                <p14:modId xmlns:p14="http://schemas.microsoft.com/office/powerpoint/2010/main" val="2441191649"/>
+              </p:ext>
+            </p:extLst>
+          </p:nvPr>
+        </p:nvGraphicFramePr>
+        <p:xfrm>
+          <a:off x="838200" y="1825625"/>
+          <a:ext cx="10515600" cy="3137939"/>
+        </p:xfrm>
+        <a:graphic>
+          <a:graphicData uri="http://schemas.openxmlformats.org/drawingml/2006/table">
+            <a:tbl>
+              <a:tblPr firstRow="1" bandRow="1">
+                <a:tableStyleId>{5C22544A-7EE6-4342-B048-85BDC9FD1C3A}</a:tableStyleId>
+              </a:tblPr>
+              <a:tblGrid>
+                <a:gridCol w="1631731">
+                  <a:extLst>
+                    <a:ext uri="{9D8B030D-6E8A-4147-A177-3AD203B41FA5}">
+                      <a16:colId xmlns:a16="http://schemas.microsoft.com/office/drawing/2014/main" val="44924583"/>
+                    </a:ext>
+                  </a:extLst>
+                </a:gridCol>
+                <a:gridCol w="1786759">
+                  <a:extLst>
+                    <a:ext uri="{9D8B030D-6E8A-4147-A177-3AD203B41FA5}">
+                      <a16:colId xmlns:a16="http://schemas.microsoft.com/office/drawing/2014/main" val="927739461"/>
+                    </a:ext>
+                  </a:extLst>
+                </a:gridCol>
+                <a:gridCol w="1996965">
+                  <a:extLst>
+                    <a:ext uri="{9D8B030D-6E8A-4147-A177-3AD203B41FA5}">
+                      <a16:colId xmlns:a16="http://schemas.microsoft.com/office/drawing/2014/main" val="3821502448"/>
+                    </a:ext>
+                  </a:extLst>
+                </a:gridCol>
+                <a:gridCol w="5100145">
+                  <a:extLst>
+                    <a:ext uri="{9D8B030D-6E8A-4147-A177-3AD203B41FA5}">
+                      <a16:colId xmlns:a16="http://schemas.microsoft.com/office/drawing/2014/main" val="4134990429"/>
+                    </a:ext>
+                  </a:extLst>
+                </a:gridCol>
+              </a:tblGrid>
+              <a:tr h="448277">
+                <a:tc>
+                  <a:txBody>
+                    <a:bodyPr/>
+                    <a:lstStyle/>
+                    <a:p>
+                      <a:r>
+                        <a:rPr lang="en-US" dirty="0"/>
+                        <a:t>Source file</a:t>
+                      </a:r>
+                    </a:p>
+                  </a:txBody>
+                  <a:tcPr/>
+                </a:tc>
+                <a:tc>
+                  <a:txBody>
+                    <a:bodyPr/>
+                    <a:lstStyle/>
+                    <a:p>
+                      <a:r>
+                        <a:rPr lang="en-US" dirty="0"/>
+                        <a:t>Indexed file</a:t>
+                      </a:r>
+                    </a:p>
+                  </a:txBody>
+                  <a:tcPr/>
+                </a:tc>
+                <a:tc>
+                  <a:txBody>
+                    <a:bodyPr/>
+                    <a:lstStyle/>
+                    <a:p>
+                      <a:r>
+                        <a:rPr lang="en-US" dirty="0"/>
+                        <a:t>Indexing tool</a:t>
+                      </a:r>
+                    </a:p>
+                  </a:txBody>
+                  <a:tcPr/>
+                </a:tc>
+                <a:tc>
+                  <a:txBody>
+                    <a:bodyPr/>
+                    <a:lstStyle/>
+                    <a:p>
+                      <a:r>
+                        <a:rPr lang="en-US" dirty="0"/>
+                        <a:t>Use case</a:t>
+                      </a:r>
+                    </a:p>
+                  </a:txBody>
+                  <a:tcPr/>
+                </a:tc>
+                <a:extLst>
+                  <a:ext uri="{0D108BD9-81ED-4DB2-BD59-A6C34878D82A}">
+                    <a16:rowId xmlns:a16="http://schemas.microsoft.com/office/drawing/2014/main" val="1809186842"/>
+                  </a:ext>
+                </a:extLst>
+              </a:tr>
+              <a:tr h="448277">
+                <a:tc>
+                  <a:txBody>
+                    <a:bodyPr/>
+                    <a:lstStyle/>
+                    <a:p>
+                      <a:r>
+                        <a:rPr lang="en-US" dirty="0"/>
+                        <a:t>.bam</a:t>
+                      </a:r>
+                    </a:p>
+                  </a:txBody>
+                  <a:tcPr/>
+                </a:tc>
+                <a:tc>
+                  <a:txBody>
+                    <a:bodyPr/>
+                    <a:lstStyle/>
+                    <a:p>
+                      <a:r>
+                        <a:rPr lang="en-US" dirty="0"/>
+                        <a:t>.bai</a:t>
+                      </a:r>
+                    </a:p>
+                  </a:txBody>
+                  <a:tcPr/>
+                </a:tc>
+                <a:tc>
+                  <a:txBody>
+                    <a:bodyPr/>
+                    <a:lstStyle/>
+                    <a:p>
+                      <a:r>
+                        <a:rPr lang="en-US" dirty="0" err="1"/>
+                        <a:t>samtools</a:t>
+                      </a:r>
+                      <a:r>
+                        <a:rPr lang="en-US" dirty="0"/>
+                        <a:t> index</a:t>
+                      </a:r>
+                    </a:p>
+                  </a:txBody>
+                  <a:tcPr/>
+                </a:tc>
+                <a:tc>
+                  <a:txBody>
+                    <a:bodyPr/>
+                    <a:lstStyle/>
+                    <a:p>
+                      <a:r>
+                        <a:rPr lang="en-US" dirty="0"/>
+                        <a:t>Visualize bam in IGV</a:t>
+                      </a:r>
+                    </a:p>
+                  </a:txBody>
+                  <a:tcPr/>
+                </a:tc>
+                <a:extLst>
+                  <a:ext uri="{0D108BD9-81ED-4DB2-BD59-A6C34878D82A}">
+                    <a16:rowId xmlns:a16="http://schemas.microsoft.com/office/drawing/2014/main" val="3235101239"/>
+                  </a:ext>
+                </a:extLst>
+              </a:tr>
+              <a:tr h="448277">
+                <a:tc>
+                  <a:txBody>
+                    <a:bodyPr/>
+                    <a:lstStyle/>
+                    <a:p>
+                      <a:r>
+                        <a:rPr lang="en-US" dirty="0"/>
+                        <a:t>.</a:t>
+                      </a:r>
+                      <a:r>
+                        <a:rPr lang="en-US" dirty="0" err="1"/>
+                        <a:t>fasta</a:t>
+                      </a:r>
+                      <a:endParaRPr lang="en-US" dirty="0"/>
+                    </a:p>
+                  </a:txBody>
+                  <a:tcPr/>
+                </a:tc>
+                <a:tc>
+                  <a:txBody>
+                    <a:bodyPr/>
+                    <a:lstStyle/>
+                    <a:p>
+                      <a:r>
+                        <a:rPr lang="en-US" dirty="0"/>
+                        <a:t>.</a:t>
+                      </a:r>
+                      <a:r>
+                        <a:rPr lang="en-US" dirty="0" err="1"/>
+                        <a:t>fai</a:t>
+                      </a:r>
+                      <a:endParaRPr lang="en-US" dirty="0"/>
+                    </a:p>
+                  </a:txBody>
+                  <a:tcPr/>
+                </a:tc>
+                <a:tc>
+                  <a:txBody>
+                    <a:bodyPr/>
+                    <a:lstStyle/>
+                    <a:p>
+                      <a:r>
+                        <a:rPr lang="en-US" dirty="0" err="1"/>
+                        <a:t>faidx</a:t>
+                      </a:r>
+                      <a:endParaRPr lang="en-US" dirty="0"/>
+                    </a:p>
+                  </a:txBody>
+                  <a:tcPr/>
+                </a:tc>
+                <a:tc>
+                  <a:txBody>
+                    <a:bodyPr/>
+                    <a:lstStyle/>
+                    <a:p>
+                      <a:endParaRPr lang="en-US" dirty="0"/>
+                    </a:p>
+                  </a:txBody>
+                  <a:tcPr/>
+                </a:tc>
+                <a:extLst>
+                  <a:ext uri="{0D108BD9-81ED-4DB2-BD59-A6C34878D82A}">
+                    <a16:rowId xmlns:a16="http://schemas.microsoft.com/office/drawing/2014/main" val="3195879192"/>
+                  </a:ext>
+                </a:extLst>
+              </a:tr>
+              <a:tr h="448277">
+                <a:tc>
+                  <a:txBody>
+                    <a:bodyPr/>
+                    <a:lstStyle/>
+                    <a:p>
+                      <a:endParaRPr lang="en-US" dirty="0"/>
+                    </a:p>
+                  </a:txBody>
+                  <a:tcPr/>
+                </a:tc>
+                <a:tc>
+                  <a:txBody>
+                    <a:bodyPr/>
+                    <a:lstStyle/>
+                    <a:p>
+                      <a:endParaRPr lang="en-US" dirty="0"/>
+                    </a:p>
+                  </a:txBody>
+                  <a:tcPr/>
+                </a:tc>
+                <a:tc>
+                  <a:txBody>
+                    <a:bodyPr/>
+                    <a:lstStyle/>
+                    <a:p>
+                      <a:endParaRPr lang="en-US" dirty="0"/>
+                    </a:p>
+                  </a:txBody>
+                  <a:tcPr/>
+                </a:tc>
+                <a:tc>
+                  <a:txBody>
+                    <a:bodyPr/>
+                    <a:lstStyle/>
+                    <a:p>
+                      <a:endParaRPr lang="en-US" dirty="0"/>
+                    </a:p>
+                  </a:txBody>
+                  <a:tcPr/>
+                </a:tc>
+                <a:extLst>
+                  <a:ext uri="{0D108BD9-81ED-4DB2-BD59-A6C34878D82A}">
+                    <a16:rowId xmlns:a16="http://schemas.microsoft.com/office/drawing/2014/main" val="3028115225"/>
+                  </a:ext>
+                </a:extLst>
+              </a:tr>
+              <a:tr h="448277">
+                <a:tc>
+                  <a:txBody>
+                    <a:bodyPr/>
+                    <a:lstStyle/>
+                    <a:p>
+                      <a:endParaRPr lang="en-US" dirty="0"/>
+                    </a:p>
+                  </a:txBody>
+                  <a:tcPr/>
+                </a:tc>
+                <a:tc>
+                  <a:txBody>
+                    <a:bodyPr/>
+                    <a:lstStyle/>
+                    <a:p>
+                      <a:endParaRPr lang="en-US" dirty="0"/>
+                    </a:p>
+                  </a:txBody>
+                  <a:tcPr/>
+                </a:tc>
+                <a:tc>
+                  <a:txBody>
+                    <a:bodyPr/>
+                    <a:lstStyle/>
+                    <a:p>
+                      <a:endParaRPr lang="en-US" dirty="0"/>
+                    </a:p>
+                  </a:txBody>
+                  <a:tcPr/>
+                </a:tc>
+                <a:tc>
+                  <a:txBody>
+                    <a:bodyPr/>
+                    <a:lstStyle/>
+                    <a:p>
+                      <a:endParaRPr lang="en-US" dirty="0"/>
+                    </a:p>
+                  </a:txBody>
+                  <a:tcPr/>
+                </a:tc>
+                <a:extLst>
+                  <a:ext uri="{0D108BD9-81ED-4DB2-BD59-A6C34878D82A}">
+                    <a16:rowId xmlns:a16="http://schemas.microsoft.com/office/drawing/2014/main" val="298293462"/>
+                  </a:ext>
+                </a:extLst>
+              </a:tr>
+              <a:tr h="448277">
+                <a:tc>
+                  <a:txBody>
+                    <a:bodyPr/>
+                    <a:lstStyle/>
+                    <a:p>
+                      <a:endParaRPr lang="en-US" dirty="0"/>
+                    </a:p>
+                  </a:txBody>
+                  <a:tcPr/>
+                </a:tc>
+                <a:tc>
+                  <a:txBody>
+                    <a:bodyPr/>
+                    <a:lstStyle/>
+                    <a:p>
+                      <a:endParaRPr lang="en-US" dirty="0"/>
+                    </a:p>
+                  </a:txBody>
+                  <a:tcPr/>
+                </a:tc>
+                <a:tc>
+                  <a:txBody>
+                    <a:bodyPr/>
+                    <a:lstStyle/>
+                    <a:p>
+                      <a:endParaRPr lang="en-US" dirty="0"/>
+                    </a:p>
+                  </a:txBody>
+                  <a:tcPr/>
+                </a:tc>
+                <a:tc>
+                  <a:txBody>
+                    <a:bodyPr/>
+                    <a:lstStyle/>
+                    <a:p>
+                      <a:endParaRPr lang="en-US" dirty="0"/>
+                    </a:p>
+                  </a:txBody>
+                  <a:tcPr/>
+                </a:tc>
+                <a:extLst>
+                  <a:ext uri="{0D108BD9-81ED-4DB2-BD59-A6C34878D82A}">
+                    <a16:rowId xmlns:a16="http://schemas.microsoft.com/office/drawing/2014/main" val="3470727191"/>
+                  </a:ext>
+                </a:extLst>
+              </a:tr>
+              <a:tr h="448277">
+                <a:tc>
+                  <a:txBody>
+                    <a:bodyPr/>
+                    <a:lstStyle/>
+                    <a:p>
+                      <a:endParaRPr lang="en-US" dirty="0"/>
+                    </a:p>
+                  </a:txBody>
+                  <a:tcPr/>
+                </a:tc>
+                <a:tc>
+                  <a:txBody>
+                    <a:bodyPr/>
+                    <a:lstStyle/>
+                    <a:p>
+                      <a:endParaRPr lang="en-US" dirty="0"/>
+                    </a:p>
+                  </a:txBody>
+                  <a:tcPr/>
+                </a:tc>
+                <a:tc>
+                  <a:txBody>
+                    <a:bodyPr/>
+                    <a:lstStyle/>
+                    <a:p>
+                      <a:endParaRPr lang="en-US" dirty="0"/>
+                    </a:p>
+                  </a:txBody>
+                  <a:tcPr/>
+                </a:tc>
+                <a:tc>
+                  <a:txBody>
+                    <a:bodyPr/>
+                    <a:lstStyle/>
+                    <a:p>
+                      <a:endParaRPr lang="en-US" dirty="0"/>
+                    </a:p>
+                  </a:txBody>
+                  <a:tcPr/>
+                </a:tc>
+                <a:extLst>
+                  <a:ext uri="{0D108BD9-81ED-4DB2-BD59-A6C34878D82A}">
+                    <a16:rowId xmlns:a16="http://schemas.microsoft.com/office/drawing/2014/main" val="1365833431"/>
+                  </a:ext>
+                </a:extLst>
+              </a:tr>
+            </a:tbl>
+          </a:graphicData>
+        </a:graphic>
+      </p:graphicFrame>
+    </p:spTree>
+    <p:extLst>
+      <p:ext uri="{BB962C8B-B14F-4D97-AF65-F5344CB8AC3E}">
+        <p14:creationId xmlns:p14="http://schemas.microsoft.com/office/powerpoint/2010/main" val="46773329"/>
       </p:ext>
     </p:extLst>
   </p:cSld>

</xml_diff>

<commit_message>
added a few things - not done
</commit_message>
<xml_diff>
--- a/assets/lectures/cbw-cshl/2019/mini/RNASeq_MiniLecture_07_Indexing.pptx
+++ b/assets/lectures/cbw-cshl/2019/mini/RNASeq_MiniLecture_07_Indexing.pptx
@@ -5,12 +5,15 @@
     <p:sldMasterId id="2147483660" r:id="rId1"/>
   </p:sldMasterIdLst>
   <p:notesMasterIdLst>
-    <p:notesMasterId r:id="rId5"/>
+    <p:notesMasterId r:id="rId8"/>
   </p:notesMasterIdLst>
   <p:sldIdLst>
     <p:sldId id="259" r:id="rId2"/>
     <p:sldId id="260" r:id="rId3"/>
-    <p:sldId id="261" r:id="rId4"/>
+    <p:sldId id="264" r:id="rId4"/>
+    <p:sldId id="263" r:id="rId5"/>
+    <p:sldId id="261" r:id="rId6"/>
+    <p:sldId id="265" r:id="rId7"/>
   </p:sldIdLst>
   <p:sldSz cx="12192000" cy="6858000"/>
   <p:notesSz cx="6858000" cy="9144000"/>
@@ -199,7 +202,7 @@
           <a:p>
             <a:fld id="{827BD9F9-8452-A342-BB1B-28ECF19E2CC5}" type="datetimeFigureOut">
               <a:rPr lang="en-US" smtClean="0"/>
-              <a:t>3/11/19</a:t>
+              <a:t>3/12/19</a:t>
             </a:fld>
             <a:endParaRPr lang="en-US"/>
           </a:p>
@@ -720,14 +723,14 @@
           </a:ln>
           <a:extLst>
             <a:ext uri="{909E8E84-426E-40dd-AFC4-6F175D3DCCD1}">
-              <a14:hiddenFill xmlns:a14="http://schemas.microsoft.com/office/drawing/2010/main" xmlns="">
+              <a14:hiddenFill xmlns="" xmlns:a14="http://schemas.microsoft.com/office/drawing/2010/main">
                 <a:solidFill>
                   <a:srgbClr val="FFFFFF"/>
                 </a:solidFill>
               </a14:hiddenFill>
             </a:ext>
             <a:ext uri="{91240B29-F687-4f45-9708-019B960494DF}">
-              <a14:hiddenLine xmlns:a14="http://schemas.microsoft.com/office/drawing/2010/main" xmlns="" w="9525">
+              <a14:hiddenLine xmlns="" xmlns:a14="http://schemas.microsoft.com/office/drawing/2010/main" w="9525">
                 <a:solidFill>
                   <a:srgbClr val="000000"/>
                 </a:solidFill>
@@ -3483,14 +3486,14 @@
           </a:ln>
           <a:extLst>
             <a:ext uri="{909E8E84-426E-40dd-AFC4-6F175D3DCCD1}">
-              <a14:hiddenFill xmlns:a14="http://schemas.microsoft.com/office/drawing/2010/main" xmlns="">
+              <a14:hiddenFill xmlns="" xmlns:a14="http://schemas.microsoft.com/office/drawing/2010/main">
                 <a:solidFill>
                   <a:srgbClr val="FFFFFF"/>
                 </a:solidFill>
               </a14:hiddenFill>
             </a:ext>
             <a:ext uri="{91240B29-F687-4f45-9708-019B960494DF}">
-              <a14:hiddenLine xmlns:a14="http://schemas.microsoft.com/office/drawing/2010/main" xmlns="" w="9525">
+              <a14:hiddenLine xmlns="" xmlns:a14="http://schemas.microsoft.com/office/drawing/2010/main" w="9525">
                 <a:solidFill>
                   <a:srgbClr val="000000"/>
                 </a:solidFill>
@@ -4377,14 +4380,14 @@
           </a:ln>
           <a:extLst>
             <a:ext uri="{909E8E84-426E-40dd-AFC4-6F175D3DCCD1}">
-              <a14:hiddenFill xmlns:a14="http://schemas.microsoft.com/office/drawing/2010/main" xmlns="">
+              <a14:hiddenFill xmlns="" xmlns:a14="http://schemas.microsoft.com/office/drawing/2010/main">
                 <a:solidFill>
                   <a:srgbClr val="FFFFFF"/>
                 </a:solidFill>
               </a14:hiddenFill>
             </a:ext>
             <a:ext uri="{91240B29-F687-4f45-9708-019B960494DF}">
-              <a14:hiddenLine xmlns:a14="http://schemas.microsoft.com/office/drawing/2010/main" xmlns="" w="9525">
+              <a14:hiddenLine xmlns="" xmlns:a14="http://schemas.microsoft.com/office/drawing/2010/main" w="9525">
                 <a:solidFill>
                   <a:srgbClr val="000000"/>
                 </a:solidFill>
@@ -4459,8 +4462,85 @@
                 <a:latin typeface="Calibri" panose="020F0502020204030204" pitchFamily="34" charset="0"/>
                 <a:cs typeface="Calibri" panose="020F0502020204030204" pitchFamily="34" charset="0"/>
               </a:rPr>
-              <a:t>Indexing allows rapid access in massive files</a:t>
-            </a:r>
+              <a:t>“Index” has many different meanings</a:t>
+            </a:r>
+          </a:p>
+        </p:txBody>
+      </p:sp>
+      <p:pic>
+        <p:nvPicPr>
+          <p:cNvPr id="6" name="Picture 5">
+            <a:extLst>
+              <a:ext uri="{FF2B5EF4-FFF2-40B4-BE49-F238E27FC236}">
+                <a16:creationId xmlns:a16="http://schemas.microsoft.com/office/drawing/2014/main" id="{ECBE8F6E-52B4-E54A-833E-A420369A4858}"/>
+              </a:ext>
+            </a:extLst>
+          </p:cNvPr>
+          <p:cNvPicPr>
+            <a:picLocks noChangeAspect="1"/>
+          </p:cNvPicPr>
+          <p:nvPr/>
+        </p:nvPicPr>
+        <p:blipFill rotWithShape="1">
+          <a:blip r:embed="rId2"/>
+          <a:srcRect b="26857"/>
+          <a:stretch/>
+        </p:blipFill>
+        <p:spPr>
+          <a:xfrm>
+            <a:off x="1397000" y="1345815"/>
+            <a:ext cx="9398000" cy="4421632"/>
+          </a:xfrm>
+          <a:prstGeom prst="rect">
+            <a:avLst/>
+          </a:prstGeom>
+        </p:spPr>
+      </p:pic>
+      <p:sp>
+        <p:nvSpPr>
+          <p:cNvPr id="7" name="TextBox 6">
+            <a:extLst>
+              <a:ext uri="{FF2B5EF4-FFF2-40B4-BE49-F238E27FC236}">
+                <a16:creationId xmlns:a16="http://schemas.microsoft.com/office/drawing/2014/main" id="{CDD14BB8-8BAE-014F-B152-C90A55394BAA}"/>
+              </a:ext>
+            </a:extLst>
+          </p:cNvPr>
+          <p:cNvSpPr txBox="1"/>
+          <p:nvPr/>
+        </p:nvSpPr>
+        <p:spPr>
+          <a:xfrm>
+            <a:off x="4230624" y="6148046"/>
+            <a:ext cx="8124019" cy="276999"/>
+          </a:xfrm>
+          <a:prstGeom prst="rect">
+            <a:avLst/>
+          </a:prstGeom>
+          <a:noFill/>
+        </p:spPr>
+        <p:txBody>
+          <a:bodyPr wrap="none" rtlCol="0">
+            <a:spAutoFit/>
+          </a:bodyPr>
+          <a:lstStyle/>
+          <a:p>
+            <a:r>
+              <a:rPr lang="en-US" sz="1200" dirty="0"/>
+              <a:t>https://</a:t>
+            </a:r>
+            <a:r>
+              <a:rPr lang="en-US" sz="1200" dirty="0" err="1"/>
+              <a:t>www.illumina.com</a:t>
+            </a:r>
+            <a:r>
+              <a:rPr lang="en-US" sz="1200" dirty="0"/>
+              <a:t>/science/technology/next-generation-sequencing/multiplex-</a:t>
+            </a:r>
+            <a:r>
+              <a:rPr lang="en-US" sz="1200" dirty="0" err="1"/>
+              <a:t>sequencing.html</a:t>
+            </a:r>
+            <a:endParaRPr lang="en-US" sz="1200" dirty="0"/>
           </a:p>
         </p:txBody>
       </p:sp>
@@ -4482,13 +4562,13 @@
         </p:nvSpPr>
         <p:spPr>
           <a:xfrm>
-            <a:off x="838200" y="956441"/>
-            <a:ext cx="10515600" cy="5220522"/>
+            <a:off x="838200" y="1090553"/>
+            <a:ext cx="7098792" cy="5102983"/>
           </a:xfrm>
         </p:spPr>
         <p:txBody>
           <a:bodyPr>
-            <a:normAutofit fontScale="85000" lnSpcReduction="10000"/>
+            <a:normAutofit/>
           </a:bodyPr>
           <a:lstStyle/>
           <a:p>
@@ -4497,191 +4577,7 @@
                 <a:latin typeface="Calibri" panose="020F0502020204030204" pitchFamily="34" charset="0"/>
                 <a:cs typeface="Calibri" panose="020F0502020204030204" pitchFamily="34" charset="0"/>
               </a:rPr>
-              <a:t>A recurring theme in genome analysis is the need to index files</a:t>
-            </a:r>
-          </a:p>
-          <a:p>
-            <a:r>
-              <a:rPr lang="en-US" dirty="0">
-                <a:latin typeface="Calibri" panose="020F0502020204030204" pitchFamily="34" charset="0"/>
-                <a:cs typeface="Calibri" panose="020F0502020204030204" pitchFamily="34" charset="0"/>
-              </a:rPr>
-              <a:t>Indexing builds a kind of table-of-contents so that a specific position in a (sorted) file can be jumped to directly, rather than having to read/scan through the entire file to find that position</a:t>
-            </a:r>
-          </a:p>
-          <a:p>
-            <a:r>
-              <a:rPr lang="en-US" dirty="0">
-                <a:latin typeface="Calibri" panose="020F0502020204030204" pitchFamily="34" charset="0"/>
-                <a:cs typeface="Calibri" panose="020F0502020204030204" pitchFamily="34" charset="0"/>
-              </a:rPr>
-              <a:t>Indexing may require significant compute/time but typically only occurs once</a:t>
-            </a:r>
-          </a:p>
-          <a:p>
-            <a:r>
-              <a:rPr lang="en-US" dirty="0">
-                <a:latin typeface="Calibri" panose="020F0502020204030204" pitchFamily="34" charset="0"/>
-                <a:cs typeface="Calibri" panose="020F0502020204030204" pitchFamily="34" charset="0"/>
-              </a:rPr>
-              <a:t>Each application may require a different indexing strategy</a:t>
-            </a:r>
-          </a:p>
-          <a:p>
-            <a:r>
-              <a:rPr lang="en-US" dirty="0">
-                <a:latin typeface="Calibri" panose="020F0502020204030204" pitchFamily="34" charset="0"/>
-                <a:cs typeface="Calibri" panose="020F0502020204030204" pitchFamily="34" charset="0"/>
-              </a:rPr>
-              <a:t>Just a few examples include:</a:t>
-            </a:r>
-          </a:p>
-          <a:p>
-            <a:pPr lvl="1"/>
-            <a:r>
-              <a:rPr lang="en-US" dirty="0">
-                <a:latin typeface="Calibri" panose="020F0502020204030204" pitchFamily="34" charset="0"/>
-                <a:cs typeface="Calibri" panose="020F0502020204030204" pitchFamily="34" charset="0"/>
-              </a:rPr>
-              <a:t>Index a </a:t>
-            </a:r>
-            <a:r>
-              <a:rPr lang="en-US" dirty="0" err="1">
-                <a:latin typeface="Calibri" panose="020F0502020204030204" pitchFamily="34" charset="0"/>
-                <a:cs typeface="Calibri" panose="020F0502020204030204" pitchFamily="34" charset="0"/>
-              </a:rPr>
-              <a:t>reference.fasta</a:t>
-            </a:r>
-            <a:r>
-              <a:rPr lang="en-US" dirty="0">
-                <a:latin typeface="Calibri" panose="020F0502020204030204" pitchFamily="34" charset="0"/>
-                <a:cs typeface="Calibri" panose="020F0502020204030204" pitchFamily="34" charset="0"/>
-              </a:rPr>
-              <a:t> file (e.g., with bwa index) for use with aligners (e.g., bwa mem)</a:t>
-            </a:r>
-          </a:p>
-          <a:p>
-            <a:pPr lvl="1"/>
-            <a:r>
-              <a:rPr lang="en-US" dirty="0">
-                <a:latin typeface="Calibri" panose="020F0502020204030204" pitchFamily="34" charset="0"/>
-                <a:cs typeface="Calibri" panose="020F0502020204030204" pitchFamily="34" charset="0"/>
-              </a:rPr>
-              <a:t>Index a </a:t>
-            </a:r>
-            <a:r>
-              <a:rPr lang="en-US" dirty="0" err="1">
-                <a:latin typeface="Calibri" panose="020F0502020204030204" pitchFamily="34" charset="0"/>
-                <a:cs typeface="Calibri" panose="020F0502020204030204" pitchFamily="34" charset="0"/>
-              </a:rPr>
-              <a:t>sequence.bam</a:t>
-            </a:r>
-            <a:r>
-              <a:rPr lang="en-US" dirty="0">
-                <a:latin typeface="Calibri" panose="020F0502020204030204" pitchFamily="34" charset="0"/>
-                <a:cs typeface="Calibri" panose="020F0502020204030204" pitchFamily="34" charset="0"/>
-              </a:rPr>
-              <a:t> file (e.g., with </a:t>
-            </a:r>
-            <a:r>
-              <a:rPr lang="en-US" dirty="0" err="1">
-                <a:latin typeface="Calibri" panose="020F0502020204030204" pitchFamily="34" charset="0"/>
-                <a:cs typeface="Calibri" panose="020F0502020204030204" pitchFamily="34" charset="0"/>
-              </a:rPr>
-              <a:t>samtools</a:t>
-            </a:r>
-            <a:r>
-              <a:rPr lang="en-US" dirty="0">
-                <a:latin typeface="Calibri" panose="020F0502020204030204" pitchFamily="34" charset="0"/>
-                <a:cs typeface="Calibri" panose="020F0502020204030204" pitchFamily="34" charset="0"/>
-              </a:rPr>
-              <a:t> index, </a:t>
-            </a:r>
-            <a:r>
-              <a:rPr lang="en-US" dirty="0" err="1">
-                <a:latin typeface="Calibri" panose="020F0502020204030204" pitchFamily="34" charset="0"/>
-                <a:cs typeface="Calibri" panose="020F0502020204030204" pitchFamily="34" charset="0"/>
-              </a:rPr>
-              <a:t>picard</a:t>
-            </a:r>
-            <a:r>
-              <a:rPr lang="en-US" dirty="0">
-                <a:latin typeface="Calibri" panose="020F0502020204030204" pitchFamily="34" charset="0"/>
-                <a:cs typeface="Calibri" panose="020F0502020204030204" pitchFamily="34" charset="0"/>
-              </a:rPr>
-              <a:t>, </a:t>
-            </a:r>
-            <a:r>
-              <a:rPr lang="en-US" dirty="0" err="1">
-                <a:latin typeface="Calibri" panose="020F0502020204030204" pitchFamily="34" charset="0"/>
-                <a:cs typeface="Calibri" panose="020F0502020204030204" pitchFamily="34" charset="0"/>
-              </a:rPr>
-              <a:t>etc</a:t>
-            </a:r>
-            <a:r>
-              <a:rPr lang="en-US" dirty="0">
-                <a:latin typeface="Calibri" panose="020F0502020204030204" pitchFamily="34" charset="0"/>
-                <a:cs typeface="Calibri" panose="020F0502020204030204" pitchFamily="34" charset="0"/>
-              </a:rPr>
-              <a:t>) for use with IGV and other applications</a:t>
-            </a:r>
-          </a:p>
-          <a:p>
-            <a:pPr lvl="1"/>
-            <a:r>
-              <a:rPr lang="en-US" dirty="0">
-                <a:latin typeface="Calibri" panose="020F0502020204030204" pitchFamily="34" charset="0"/>
-                <a:cs typeface="Calibri" panose="020F0502020204030204" pitchFamily="34" charset="0"/>
-              </a:rPr>
-              <a:t>Index a </a:t>
-            </a:r>
-            <a:r>
-              <a:rPr lang="en-US" dirty="0" err="1">
-                <a:latin typeface="Calibri" panose="020F0502020204030204" pitchFamily="34" charset="0"/>
-                <a:cs typeface="Calibri" panose="020F0502020204030204" pitchFamily="34" charset="0"/>
-              </a:rPr>
-              <a:t>reference.fasta</a:t>
-            </a:r>
-            <a:r>
-              <a:rPr lang="en-US" dirty="0">
-                <a:latin typeface="Calibri" panose="020F0502020204030204" pitchFamily="34" charset="0"/>
-                <a:cs typeface="Calibri" panose="020F0502020204030204" pitchFamily="34" charset="0"/>
-              </a:rPr>
-              <a:t> file (e.g., with hisat2-build) for use with a splice-aware aligner (e.g., HISAT2)</a:t>
-            </a:r>
-          </a:p>
-          <a:p>
-            <a:pPr lvl="1"/>
-            <a:r>
-              <a:rPr lang="en-US" dirty="0">
-                <a:latin typeface="Calibri" panose="020F0502020204030204" pitchFamily="34" charset="0"/>
-                <a:cs typeface="Calibri" panose="020F0502020204030204" pitchFamily="34" charset="0"/>
-              </a:rPr>
-              <a:t>Index a VCF file (e.g., with GATK </a:t>
-            </a:r>
-            <a:r>
-              <a:rPr lang="en-US" dirty="0" err="1">
-                <a:latin typeface="Calibri" panose="020F0502020204030204" pitchFamily="34" charset="0"/>
-                <a:cs typeface="Calibri" panose="020F0502020204030204" pitchFamily="34" charset="0"/>
-              </a:rPr>
-              <a:t>IndexFeatureFile</a:t>
-            </a:r>
-            <a:r>
-              <a:rPr lang="en-US" dirty="0">
-                <a:latin typeface="Calibri" panose="020F0502020204030204" pitchFamily="34" charset="0"/>
-                <a:cs typeface="Calibri" panose="020F0502020204030204" pitchFamily="34" charset="0"/>
-              </a:rPr>
-              <a:t>) for use with variant filtering software </a:t>
-            </a:r>
-          </a:p>
-          <a:p>
-            <a:pPr lvl="1"/>
-            <a:r>
-              <a:rPr lang="en-US" dirty="0">
-                <a:latin typeface="Calibri" panose="020F0502020204030204" pitchFamily="34" charset="0"/>
-                <a:cs typeface="Calibri" panose="020F0502020204030204" pitchFamily="34" charset="0"/>
-              </a:rPr>
-              <a:t>Many more…</a:t>
+              <a:t>Indexes can refer to unique barcodes used for multiplexing DNA before sequencing</a:t>
             </a:r>
           </a:p>
         </p:txBody>
@@ -4721,6 +4617,772 @@
           <p:cNvPr id="2" name="Title 1">
             <a:extLst>
               <a:ext uri="{FF2B5EF4-FFF2-40B4-BE49-F238E27FC236}">
+                <a16:creationId xmlns:a16="http://schemas.microsoft.com/office/drawing/2014/main" id="{02BF5CD1-D1CD-EC4E-BC30-B25D3CB8C977}"/>
+              </a:ext>
+            </a:extLst>
+          </p:cNvPr>
+          <p:cNvSpPr>
+            <a:spLocks noGrp="1"/>
+          </p:cNvSpPr>
+          <p:nvPr>
+            <p:ph type="title"/>
+          </p:nvPr>
+        </p:nvSpPr>
+        <p:spPr>
+          <a:xfrm>
+            <a:off x="838200" y="102366"/>
+            <a:ext cx="10515600" cy="780503"/>
+          </a:xfrm>
+        </p:spPr>
+        <p:txBody>
+          <a:bodyPr>
+            <a:normAutofit/>
+          </a:bodyPr>
+          <a:lstStyle/>
+          <a:p>
+            <a:r>
+              <a:rPr lang="en-US" sz="4000" dirty="0">
+                <a:latin typeface="Calibri" panose="020F0502020204030204" pitchFamily="34" charset="0"/>
+                <a:cs typeface="Calibri" panose="020F0502020204030204" pitchFamily="34" charset="0"/>
+              </a:rPr>
+              <a:t>Indexing allows rapid access in massive files</a:t>
+            </a:r>
+          </a:p>
+        </p:txBody>
+      </p:sp>
+      <p:sp>
+        <p:nvSpPr>
+          <p:cNvPr id="3" name="Content Placeholder 2">
+            <a:extLst>
+              <a:ext uri="{FF2B5EF4-FFF2-40B4-BE49-F238E27FC236}">
+                <a16:creationId xmlns:a16="http://schemas.microsoft.com/office/drawing/2014/main" id="{38FC07D5-B6CF-AF47-8871-5111BE13BD39}"/>
+              </a:ext>
+            </a:extLst>
+          </p:cNvPr>
+          <p:cNvSpPr>
+            <a:spLocks noGrp="1"/>
+          </p:cNvSpPr>
+          <p:nvPr>
+            <p:ph idx="1"/>
+          </p:nvPr>
+        </p:nvSpPr>
+        <p:spPr>
+          <a:xfrm>
+            <a:off x="838200" y="956441"/>
+            <a:ext cx="10515600" cy="5220522"/>
+          </a:xfrm>
+        </p:spPr>
+        <p:txBody>
+          <a:bodyPr>
+            <a:normAutofit/>
+          </a:bodyPr>
+          <a:lstStyle/>
+          <a:p>
+            <a:r>
+              <a:rPr lang="en-US" dirty="0">
+                <a:latin typeface="Calibri" panose="020F0502020204030204" pitchFamily="34" charset="0"/>
+                <a:cs typeface="Calibri" panose="020F0502020204030204" pitchFamily="34" charset="0"/>
+              </a:rPr>
+              <a:t>Indexing is a recurring theme in genome analysis</a:t>
+            </a:r>
+          </a:p>
+          <a:p>
+            <a:r>
+              <a:rPr lang="en-US" dirty="0">
+                <a:latin typeface="Calibri" panose="020F0502020204030204" pitchFamily="34" charset="0"/>
+                <a:cs typeface="Calibri" panose="020F0502020204030204" pitchFamily="34" charset="0"/>
+              </a:rPr>
+              <a:t>Files are *big* - scanning through them can take a long time</a:t>
+            </a:r>
+          </a:p>
+          <a:p>
+            <a:r>
+              <a:rPr lang="en-US" dirty="0">
+                <a:latin typeface="Calibri" panose="020F0502020204030204" pitchFamily="34" charset="0"/>
+                <a:cs typeface="Calibri" panose="020F0502020204030204" pitchFamily="34" charset="0"/>
+              </a:rPr>
+              <a:t>Indexing builds a table-of-contents so that we can jump directly to specific positions</a:t>
+            </a:r>
+          </a:p>
+          <a:p>
+            <a:pPr marL="0" indent="0">
+              <a:buNone/>
+            </a:pPr>
+            <a:endParaRPr lang="en-US" dirty="0">
+              <a:latin typeface="Calibri" panose="020F0502020204030204" pitchFamily="34" charset="0"/>
+              <a:cs typeface="Calibri" panose="020F0502020204030204" pitchFamily="34" charset="0"/>
+            </a:endParaRPr>
+          </a:p>
+          <a:p>
+            <a:r>
+              <a:rPr lang="en-US" dirty="0">
+                <a:latin typeface="Calibri" panose="020F0502020204030204" pitchFamily="34" charset="0"/>
+                <a:cs typeface="Calibri" panose="020F0502020204030204" pitchFamily="34" charset="0"/>
+              </a:rPr>
+              <a:t>Indexing may require significant compute/time but typically only occurs once</a:t>
+            </a:r>
+          </a:p>
+          <a:p>
+            <a:r>
+              <a:rPr lang="en-US" dirty="0">
+                <a:latin typeface="Calibri" panose="020F0502020204030204" pitchFamily="34" charset="0"/>
+                <a:cs typeface="Calibri" panose="020F0502020204030204" pitchFamily="34" charset="0"/>
+              </a:rPr>
+              <a:t>Each application may require a different indexing strategy</a:t>
+            </a:r>
+          </a:p>
+        </p:txBody>
+      </p:sp>
+    </p:spTree>
+    <p:extLst>
+      <p:ext uri="{BB962C8B-B14F-4D97-AF65-F5344CB8AC3E}">
+        <p14:creationId xmlns:p14="http://schemas.microsoft.com/office/powerpoint/2010/main" val="2547435122"/>
+      </p:ext>
+    </p:extLst>
+  </p:cSld>
+  <p:clrMapOvr>
+    <a:masterClrMapping/>
+  </p:clrMapOvr>
+</p:sld>
+</file>
+
+<file path=ppt/slides/slide4.xml><?xml version="1.0" encoding="utf-8"?>
+<p:sld xmlns:a="http://schemas.openxmlformats.org/drawingml/2006/main" xmlns:r="http://schemas.openxmlformats.org/officeDocument/2006/relationships" xmlns:p="http://schemas.openxmlformats.org/presentationml/2006/main">
+  <p:cSld>
+    <p:spTree>
+      <p:nvGrpSpPr>
+        <p:cNvPr id="1" name=""/>
+        <p:cNvGrpSpPr/>
+        <p:nvPr/>
+      </p:nvGrpSpPr>
+      <p:grpSpPr>
+        <a:xfrm>
+          <a:off x="0" y="0"/>
+          <a:ext cx="0" cy="0"/>
+          <a:chOff x="0" y="0"/>
+          <a:chExt cx="0" cy="0"/>
+        </a:xfrm>
+      </p:grpSpPr>
+      <p:sp>
+        <p:nvSpPr>
+          <p:cNvPr id="2" name="Title 1">
+            <a:extLst>
+              <a:ext uri="{FF2B5EF4-FFF2-40B4-BE49-F238E27FC236}">
+                <a16:creationId xmlns:a16="http://schemas.microsoft.com/office/drawing/2014/main" id="{02BF5CD1-D1CD-EC4E-BC30-B25D3CB8C977}"/>
+              </a:ext>
+            </a:extLst>
+          </p:cNvPr>
+          <p:cNvSpPr>
+            <a:spLocks noGrp="1"/>
+          </p:cNvSpPr>
+          <p:nvPr>
+            <p:ph type="title"/>
+          </p:nvPr>
+        </p:nvSpPr>
+        <p:spPr>
+          <a:xfrm>
+            <a:off x="838200" y="102366"/>
+            <a:ext cx="10515600" cy="780503"/>
+          </a:xfrm>
+        </p:spPr>
+        <p:txBody>
+          <a:bodyPr>
+            <a:normAutofit/>
+          </a:bodyPr>
+          <a:lstStyle/>
+          <a:p>
+            <a:r>
+              <a:rPr lang="en-US" sz="4000" dirty="0">
+                <a:latin typeface="Calibri" panose="020F0502020204030204" pitchFamily="34" charset="0"/>
+                <a:cs typeface="Calibri" panose="020F0502020204030204" pitchFamily="34" charset="0"/>
+              </a:rPr>
+              <a:t>What’s inside a </a:t>
+            </a:r>
+            <a:r>
+              <a:rPr lang="en-US" sz="4000" dirty="0" err="1">
+                <a:latin typeface="Calibri" panose="020F0502020204030204" pitchFamily="34" charset="0"/>
+                <a:cs typeface="Calibri" panose="020F0502020204030204" pitchFamily="34" charset="0"/>
+              </a:rPr>
+              <a:t>fasta’s</a:t>
+            </a:r>
+            <a:r>
+              <a:rPr lang="en-US" sz="4000" dirty="0">
+                <a:latin typeface="Calibri" panose="020F0502020204030204" pitchFamily="34" charset="0"/>
+                <a:cs typeface="Calibri" panose="020F0502020204030204" pitchFamily="34" charset="0"/>
+              </a:rPr>
+              <a:t> index file? (.</a:t>
+            </a:r>
+            <a:r>
+              <a:rPr lang="en-US" sz="4000" dirty="0" err="1">
+                <a:latin typeface="Calibri" panose="020F0502020204030204" pitchFamily="34" charset="0"/>
+                <a:cs typeface="Calibri" panose="020F0502020204030204" pitchFamily="34" charset="0"/>
+              </a:rPr>
+              <a:t>fai</a:t>
+            </a:r>
+            <a:r>
+              <a:rPr lang="en-US" sz="4000" dirty="0">
+                <a:latin typeface="Calibri" panose="020F0502020204030204" pitchFamily="34" charset="0"/>
+                <a:cs typeface="Calibri" panose="020F0502020204030204" pitchFamily="34" charset="0"/>
+              </a:rPr>
+              <a:t>)</a:t>
+            </a:r>
+          </a:p>
+        </p:txBody>
+      </p:sp>
+      <p:sp>
+        <p:nvSpPr>
+          <p:cNvPr id="3" name="Content Placeholder 2">
+            <a:extLst>
+              <a:ext uri="{FF2B5EF4-FFF2-40B4-BE49-F238E27FC236}">
+                <a16:creationId xmlns:a16="http://schemas.microsoft.com/office/drawing/2014/main" id="{38FC07D5-B6CF-AF47-8871-5111BE13BD39}"/>
+              </a:ext>
+            </a:extLst>
+          </p:cNvPr>
+          <p:cNvSpPr>
+            <a:spLocks noGrp="1"/>
+          </p:cNvSpPr>
+          <p:nvPr>
+            <p:ph idx="1"/>
+          </p:nvPr>
+        </p:nvSpPr>
+        <p:spPr>
+          <a:xfrm>
+            <a:off x="2471405" y="2443498"/>
+            <a:ext cx="6521971" cy="3855403"/>
+          </a:xfrm>
+        </p:spPr>
+        <p:txBody>
+          <a:bodyPr>
+            <a:normAutofit fontScale="77500" lnSpcReduction="20000"/>
+          </a:bodyPr>
+          <a:lstStyle/>
+          <a:p>
+            <a:pPr marL="0" indent="0">
+              <a:buNone/>
+            </a:pPr>
+            <a:r>
+              <a:rPr lang="en-US" dirty="0">
+                <a:latin typeface="Courier" pitchFamily="2" charset="0"/>
+                <a:cs typeface="Calibri" panose="020F0502020204030204" pitchFamily="34" charset="0"/>
+              </a:rPr>
+              <a:t>chr1   248956422  6           60  61</a:t>
+            </a:r>
+          </a:p>
+          <a:p>
+            <a:pPr marL="0" indent="0">
+              <a:buNone/>
+            </a:pPr>
+            <a:r>
+              <a:rPr lang="en-US" dirty="0">
+                <a:latin typeface="Courier" pitchFamily="2" charset="0"/>
+                <a:cs typeface="Calibri" panose="020F0502020204030204" pitchFamily="34" charset="0"/>
+              </a:rPr>
+              <a:t>chr2   242193529  253105708   60  61</a:t>
+            </a:r>
+          </a:p>
+          <a:p>
+            <a:pPr marL="0" indent="0">
+              <a:buNone/>
+            </a:pPr>
+            <a:r>
+              <a:rPr lang="en-US" dirty="0">
+                <a:latin typeface="Courier" pitchFamily="2" charset="0"/>
+                <a:cs typeface="Calibri" panose="020F0502020204030204" pitchFamily="34" charset="0"/>
+              </a:rPr>
+              <a:t>chr3   198295559  499335802   60  61</a:t>
+            </a:r>
+          </a:p>
+          <a:p>
+            <a:pPr marL="0" indent="0">
+              <a:buNone/>
+            </a:pPr>
+            <a:r>
+              <a:rPr lang="en-US" dirty="0">
+                <a:latin typeface="Courier" pitchFamily="2" charset="0"/>
+                <a:cs typeface="Calibri" panose="020F0502020204030204" pitchFamily="34" charset="0"/>
+              </a:rPr>
+              <a:t>chr4   190214555  700936293   60  61</a:t>
+            </a:r>
+          </a:p>
+          <a:p>
+            <a:pPr marL="0" indent="0">
+              <a:buNone/>
+            </a:pPr>
+            <a:r>
+              <a:rPr lang="en-US" dirty="0">
+                <a:latin typeface="Courier" pitchFamily="2" charset="0"/>
+                <a:cs typeface="Calibri" panose="020F0502020204030204" pitchFamily="34" charset="0"/>
+              </a:rPr>
+              <a:t>chr5   181538259  894321097   60  61</a:t>
+            </a:r>
+          </a:p>
+          <a:p>
+            <a:pPr marL="0" indent="0">
+              <a:buNone/>
+            </a:pPr>
+            <a:r>
+              <a:rPr lang="en-US" dirty="0">
+                <a:latin typeface="Courier" pitchFamily="2" charset="0"/>
+                <a:cs typeface="Calibri" panose="020F0502020204030204" pitchFamily="34" charset="0"/>
+              </a:rPr>
+              <a:t>chr6   170805979  1078885000  60  61</a:t>
+            </a:r>
+          </a:p>
+          <a:p>
+            <a:pPr marL="0" indent="0">
+              <a:buNone/>
+            </a:pPr>
+            <a:r>
+              <a:rPr lang="en-US" dirty="0">
+                <a:latin typeface="Courier" pitchFamily="2" charset="0"/>
+                <a:cs typeface="Calibri" panose="020F0502020204030204" pitchFamily="34" charset="0"/>
+              </a:rPr>
+              <a:t>chr7   159345973  1252537752  60  61</a:t>
+            </a:r>
+          </a:p>
+          <a:p>
+            <a:pPr marL="0" indent="0">
+              <a:buNone/>
+            </a:pPr>
+            <a:r>
+              <a:rPr lang="en-US" dirty="0">
+                <a:latin typeface="Courier" pitchFamily="2" charset="0"/>
+                <a:cs typeface="Calibri" panose="020F0502020204030204" pitchFamily="34" charset="0"/>
+              </a:rPr>
+              <a:t>chr8   145138636  1414539498  60  61</a:t>
+            </a:r>
+          </a:p>
+          <a:p>
+            <a:pPr marL="0" indent="0">
+              <a:buNone/>
+            </a:pPr>
+            <a:r>
+              <a:rPr lang="en-US" dirty="0">
+                <a:latin typeface="Courier" pitchFamily="2" charset="0"/>
+                <a:cs typeface="Calibri" panose="020F0502020204030204" pitchFamily="34" charset="0"/>
+              </a:rPr>
+              <a:t>chr9   138394717  1562097118  60  61</a:t>
+            </a:r>
+          </a:p>
+          <a:p>
+            <a:pPr marL="0" indent="0">
+              <a:buNone/>
+            </a:pPr>
+            <a:r>
+              <a:rPr lang="en-US" dirty="0">
+                <a:latin typeface="Courier" pitchFamily="2" charset="0"/>
+                <a:cs typeface="Calibri" panose="020F0502020204030204" pitchFamily="34" charset="0"/>
+              </a:rPr>
+              <a:t>chr10  133797422  1702798421  60  61</a:t>
+            </a:r>
+          </a:p>
+        </p:txBody>
+      </p:sp>
+      <p:sp>
+        <p:nvSpPr>
+          <p:cNvPr id="4" name="TextBox 3">
+            <a:extLst>
+              <a:ext uri="{FF2B5EF4-FFF2-40B4-BE49-F238E27FC236}">
+                <a16:creationId xmlns:a16="http://schemas.microsoft.com/office/drawing/2014/main" id="{3BAB0762-FD30-FB42-89BD-B55B8CB1AA8D}"/>
+              </a:ext>
+            </a:extLst>
+          </p:cNvPr>
+          <p:cNvSpPr txBox="1"/>
+          <p:nvPr/>
+        </p:nvSpPr>
+        <p:spPr>
+          <a:xfrm>
+            <a:off x="814328" y="1569351"/>
+            <a:ext cx="1617751" cy="369332"/>
+          </a:xfrm>
+          <a:prstGeom prst="rect">
+            <a:avLst/>
+          </a:prstGeom>
+          <a:noFill/>
+        </p:spPr>
+        <p:txBody>
+          <a:bodyPr wrap="none" rtlCol="0">
+            <a:spAutoFit/>
+          </a:bodyPr>
+          <a:lstStyle/>
+          <a:p>
+            <a:r>
+              <a:rPr lang="en-US" dirty="0"/>
+              <a:t>contig name</a:t>
+            </a:r>
+          </a:p>
+        </p:txBody>
+      </p:sp>
+      <p:sp>
+        <p:nvSpPr>
+          <p:cNvPr id="5" name="TextBox 4">
+            <a:extLst>
+              <a:ext uri="{FF2B5EF4-FFF2-40B4-BE49-F238E27FC236}">
+                <a16:creationId xmlns:a16="http://schemas.microsoft.com/office/drawing/2014/main" id="{336EA848-9BF4-514D-A4F1-F26C760E1899}"/>
+              </a:ext>
+            </a:extLst>
+          </p:cNvPr>
+          <p:cNvSpPr txBox="1"/>
+          <p:nvPr/>
+        </p:nvSpPr>
+        <p:spPr>
+          <a:xfrm>
+            <a:off x="2711971" y="1200019"/>
+            <a:ext cx="1923925" cy="369332"/>
+          </a:xfrm>
+          <a:prstGeom prst="rect">
+            <a:avLst/>
+          </a:prstGeom>
+          <a:noFill/>
+        </p:spPr>
+        <p:txBody>
+          <a:bodyPr wrap="none" rtlCol="0">
+            <a:spAutoFit/>
+          </a:bodyPr>
+          <a:lstStyle/>
+          <a:p>
+            <a:r>
+              <a:rPr lang="en-US" dirty="0"/>
+              <a:t>bases in contig</a:t>
+            </a:r>
+          </a:p>
+        </p:txBody>
+      </p:sp>
+      <p:sp>
+        <p:nvSpPr>
+          <p:cNvPr id="6" name="TextBox 5">
+            <a:extLst>
+              <a:ext uri="{FF2B5EF4-FFF2-40B4-BE49-F238E27FC236}">
+                <a16:creationId xmlns:a16="http://schemas.microsoft.com/office/drawing/2014/main" id="{A8415BA4-6473-0349-8C5F-7AA884C1BCFF}"/>
+              </a:ext>
+            </a:extLst>
+          </p:cNvPr>
+          <p:cNvSpPr txBox="1"/>
+          <p:nvPr/>
+        </p:nvSpPr>
+        <p:spPr>
+          <a:xfrm>
+            <a:off x="5154168" y="981874"/>
+            <a:ext cx="2157984" cy="923330"/>
+          </a:xfrm>
+          <a:prstGeom prst="rect">
+            <a:avLst/>
+          </a:prstGeom>
+          <a:noFill/>
+        </p:spPr>
+        <p:txBody>
+          <a:bodyPr wrap="square" rtlCol="0">
+            <a:spAutoFit/>
+          </a:bodyPr>
+          <a:lstStyle/>
+          <a:p>
+            <a:r>
+              <a:rPr lang="en-US" dirty="0"/>
+              <a:t>byte index of the file where the contig begins</a:t>
+            </a:r>
+          </a:p>
+        </p:txBody>
+      </p:sp>
+      <p:sp>
+        <p:nvSpPr>
+          <p:cNvPr id="7" name="TextBox 6">
+            <a:extLst>
+              <a:ext uri="{FF2B5EF4-FFF2-40B4-BE49-F238E27FC236}">
+                <a16:creationId xmlns:a16="http://schemas.microsoft.com/office/drawing/2014/main" id="{E8FE991A-C621-5647-BC67-4DC52D6D65DE}"/>
+              </a:ext>
+            </a:extLst>
+          </p:cNvPr>
+          <p:cNvSpPr txBox="1"/>
+          <p:nvPr/>
+        </p:nvSpPr>
+        <p:spPr>
+          <a:xfrm>
+            <a:off x="7488300" y="1020496"/>
+            <a:ext cx="2157984" cy="369332"/>
+          </a:xfrm>
+          <a:prstGeom prst="rect">
+            <a:avLst/>
+          </a:prstGeom>
+          <a:noFill/>
+        </p:spPr>
+        <p:txBody>
+          <a:bodyPr wrap="square" rtlCol="0">
+            <a:spAutoFit/>
+          </a:bodyPr>
+          <a:lstStyle/>
+          <a:p>
+            <a:r>
+              <a:rPr lang="en-US" dirty="0"/>
+              <a:t>bases per line</a:t>
+            </a:r>
+          </a:p>
+        </p:txBody>
+      </p:sp>
+      <p:sp>
+        <p:nvSpPr>
+          <p:cNvPr id="8" name="TextBox 7">
+            <a:extLst>
+              <a:ext uri="{FF2B5EF4-FFF2-40B4-BE49-F238E27FC236}">
+                <a16:creationId xmlns:a16="http://schemas.microsoft.com/office/drawing/2014/main" id="{7C4A4D44-6FCC-B546-9990-8105C6BC57BE}"/>
+              </a:ext>
+            </a:extLst>
+          </p:cNvPr>
+          <p:cNvSpPr txBox="1"/>
+          <p:nvPr/>
+        </p:nvSpPr>
+        <p:spPr>
+          <a:xfrm>
+            <a:off x="9195816" y="1501440"/>
+            <a:ext cx="2157984" cy="369332"/>
+          </a:xfrm>
+          <a:prstGeom prst="rect">
+            <a:avLst/>
+          </a:prstGeom>
+          <a:noFill/>
+        </p:spPr>
+        <p:txBody>
+          <a:bodyPr wrap="square" rtlCol="0">
+            <a:spAutoFit/>
+          </a:bodyPr>
+          <a:lstStyle/>
+          <a:p>
+            <a:r>
+              <a:rPr lang="en-US" dirty="0"/>
+              <a:t>bytes per line</a:t>
+            </a:r>
+          </a:p>
+        </p:txBody>
+      </p:sp>
+      <p:cxnSp>
+        <p:nvCxnSpPr>
+          <p:cNvPr id="10" name="Straight Connector 9">
+            <a:extLst>
+              <a:ext uri="{FF2B5EF4-FFF2-40B4-BE49-F238E27FC236}">
+                <a16:creationId xmlns:a16="http://schemas.microsoft.com/office/drawing/2014/main" id="{581C5CAD-CFF9-BD40-ADCE-3B7C150456E1}"/>
+              </a:ext>
+            </a:extLst>
+          </p:cNvPr>
+          <p:cNvCxnSpPr>
+            <a:cxnSpLocks/>
+          </p:cNvCxnSpPr>
+          <p:nvPr/>
+        </p:nvCxnSpPr>
+        <p:spPr>
+          <a:xfrm>
+            <a:off x="2170176" y="1938683"/>
+            <a:ext cx="541795" cy="352415"/>
+          </a:xfrm>
+          <a:prstGeom prst="line">
+            <a:avLst/>
+          </a:prstGeom>
+          <a:ln/>
+        </p:spPr>
+        <p:style>
+          <a:lnRef idx="1">
+            <a:schemeClr val="dk1"/>
+          </a:lnRef>
+          <a:fillRef idx="0">
+            <a:schemeClr val="dk1"/>
+          </a:fillRef>
+          <a:effectRef idx="0">
+            <a:schemeClr val="dk1"/>
+          </a:effectRef>
+          <a:fontRef idx="minor">
+            <a:schemeClr val="tx1"/>
+          </a:fontRef>
+        </p:style>
+      </p:cxnSp>
+      <p:cxnSp>
+        <p:nvCxnSpPr>
+          <p:cNvPr id="11" name="Straight Connector 10">
+            <a:extLst>
+              <a:ext uri="{FF2B5EF4-FFF2-40B4-BE49-F238E27FC236}">
+                <a16:creationId xmlns:a16="http://schemas.microsoft.com/office/drawing/2014/main" id="{554513BA-4F42-F04B-8113-90D53273A3C9}"/>
+              </a:ext>
+            </a:extLst>
+          </p:cNvPr>
+          <p:cNvCxnSpPr>
+            <a:cxnSpLocks/>
+          </p:cNvCxnSpPr>
+          <p:nvPr/>
+        </p:nvCxnSpPr>
+        <p:spPr>
+          <a:xfrm>
+            <a:off x="3766476" y="1681812"/>
+            <a:ext cx="695796" cy="609286"/>
+          </a:xfrm>
+          <a:prstGeom prst="line">
+            <a:avLst/>
+          </a:prstGeom>
+          <a:ln/>
+        </p:spPr>
+        <p:style>
+          <a:lnRef idx="1">
+            <a:schemeClr val="dk1"/>
+          </a:lnRef>
+          <a:fillRef idx="0">
+            <a:schemeClr val="dk1"/>
+          </a:fillRef>
+          <a:effectRef idx="0">
+            <a:schemeClr val="dk1"/>
+          </a:effectRef>
+          <a:fontRef idx="minor">
+            <a:schemeClr val="tx1"/>
+          </a:fontRef>
+        </p:style>
+      </p:cxnSp>
+      <p:cxnSp>
+        <p:nvCxnSpPr>
+          <p:cNvPr id="12" name="Straight Connector 11">
+            <a:extLst>
+              <a:ext uri="{FF2B5EF4-FFF2-40B4-BE49-F238E27FC236}">
+                <a16:creationId xmlns:a16="http://schemas.microsoft.com/office/drawing/2014/main" id="{4A035C64-9D79-114F-953F-1412F8AF5BF1}"/>
+              </a:ext>
+            </a:extLst>
+          </p:cNvPr>
+          <p:cNvCxnSpPr>
+            <a:cxnSpLocks/>
+          </p:cNvCxnSpPr>
+          <p:nvPr/>
+        </p:nvCxnSpPr>
+        <p:spPr>
+          <a:xfrm flipH="1">
+            <a:off x="8839200" y="1917041"/>
+            <a:ext cx="1179053" cy="294809"/>
+          </a:xfrm>
+          <a:prstGeom prst="line">
+            <a:avLst/>
+          </a:prstGeom>
+          <a:ln/>
+        </p:spPr>
+        <p:style>
+          <a:lnRef idx="1">
+            <a:schemeClr val="dk1"/>
+          </a:lnRef>
+          <a:fillRef idx="0">
+            <a:schemeClr val="dk1"/>
+          </a:fillRef>
+          <a:effectRef idx="0">
+            <a:schemeClr val="dk1"/>
+          </a:effectRef>
+          <a:fontRef idx="minor">
+            <a:schemeClr val="tx1"/>
+          </a:fontRef>
+        </p:style>
+      </p:cxnSp>
+      <p:cxnSp>
+        <p:nvCxnSpPr>
+          <p:cNvPr id="15" name="Straight Connector 14">
+            <a:extLst>
+              <a:ext uri="{FF2B5EF4-FFF2-40B4-BE49-F238E27FC236}">
+                <a16:creationId xmlns:a16="http://schemas.microsoft.com/office/drawing/2014/main" id="{16240F0D-9A1D-BC47-98B4-6E29067D5EAF}"/>
+              </a:ext>
+            </a:extLst>
+          </p:cNvPr>
+          <p:cNvCxnSpPr>
+            <a:cxnSpLocks/>
+          </p:cNvCxnSpPr>
+          <p:nvPr/>
+        </p:nvCxnSpPr>
+        <p:spPr>
+          <a:xfrm flipH="1">
+            <a:off x="7830424" y="1443539"/>
+            <a:ext cx="545480" cy="647544"/>
+          </a:xfrm>
+          <a:prstGeom prst="line">
+            <a:avLst/>
+          </a:prstGeom>
+          <a:ln/>
+        </p:spPr>
+        <p:style>
+          <a:lnRef idx="1">
+            <a:schemeClr val="dk1"/>
+          </a:lnRef>
+          <a:fillRef idx="0">
+            <a:schemeClr val="dk1"/>
+          </a:fillRef>
+          <a:effectRef idx="0">
+            <a:schemeClr val="dk1"/>
+          </a:effectRef>
+          <a:fontRef idx="minor">
+            <a:schemeClr val="tx1"/>
+          </a:fontRef>
+        </p:style>
+      </p:cxnSp>
+      <p:cxnSp>
+        <p:nvCxnSpPr>
+          <p:cNvPr id="18" name="Straight Connector 17">
+            <a:extLst>
+              <a:ext uri="{FF2B5EF4-FFF2-40B4-BE49-F238E27FC236}">
+                <a16:creationId xmlns:a16="http://schemas.microsoft.com/office/drawing/2014/main" id="{5E2D2EC8-A630-6540-972B-610865B8035E}"/>
+              </a:ext>
+            </a:extLst>
+          </p:cNvPr>
+          <p:cNvCxnSpPr>
+            <a:cxnSpLocks/>
+          </p:cNvCxnSpPr>
+          <p:nvPr/>
+        </p:nvCxnSpPr>
+        <p:spPr>
+          <a:xfrm>
+            <a:off x="6083808" y="1953655"/>
+            <a:ext cx="0" cy="322469"/>
+          </a:xfrm>
+          <a:prstGeom prst="line">
+            <a:avLst/>
+          </a:prstGeom>
+          <a:ln/>
+        </p:spPr>
+        <p:style>
+          <a:lnRef idx="1">
+            <a:schemeClr val="dk1"/>
+          </a:lnRef>
+          <a:fillRef idx="0">
+            <a:schemeClr val="dk1"/>
+          </a:fillRef>
+          <a:effectRef idx="0">
+            <a:schemeClr val="dk1"/>
+          </a:effectRef>
+          <a:fontRef idx="minor">
+            <a:schemeClr val="tx1"/>
+          </a:fontRef>
+        </p:style>
+      </p:cxnSp>
+    </p:spTree>
+    <p:extLst>
+      <p:ext uri="{BB962C8B-B14F-4D97-AF65-F5344CB8AC3E}">
+        <p14:creationId xmlns:p14="http://schemas.microsoft.com/office/powerpoint/2010/main" val="1486291816"/>
+      </p:ext>
+    </p:extLst>
+  </p:cSld>
+  <p:clrMapOvr>
+    <a:masterClrMapping/>
+  </p:clrMapOvr>
+</p:sld>
+</file>
+
+<file path=ppt/slides/slide5.xml><?xml version="1.0" encoding="utf-8"?>
+<p:sld xmlns:a="http://schemas.openxmlformats.org/drawingml/2006/main" xmlns:r="http://schemas.openxmlformats.org/officeDocument/2006/relationships" xmlns:p="http://schemas.openxmlformats.org/presentationml/2006/main">
+  <p:cSld>
+    <p:spTree>
+      <p:nvGrpSpPr>
+        <p:cNvPr id="1" name=""/>
+        <p:cNvGrpSpPr/>
+        <p:nvPr/>
+      </p:nvGrpSpPr>
+      <p:grpSpPr>
+        <a:xfrm>
+          <a:off x="0" y="0"/>
+          <a:ext cx="0" cy="0"/>
+          <a:chOff x="0" y="0"/>
+          <a:chExt cx="0" cy="0"/>
+        </a:xfrm>
+      </p:grpSpPr>
+      <p:sp>
+        <p:nvSpPr>
+          <p:cNvPr id="2" name="Title 1">
+            <a:extLst>
+              <a:ext uri="{FF2B5EF4-FFF2-40B4-BE49-F238E27FC236}">
                 <a16:creationId xmlns:a16="http://schemas.microsoft.com/office/drawing/2014/main" id="{FBADFF81-2258-C341-84B1-4D4962CB58B6}"/>
               </a:ext>
             </a:extLst>
@@ -4770,14 +5432,14 @@
             <p:ph idx="1"/>
             <p:extLst>
               <p:ext uri="{D42A27DB-BD31-4B8C-83A1-F6EECF244321}">
-                <p14:modId xmlns:p14="http://schemas.microsoft.com/office/powerpoint/2010/main" val="2441191649"/>
+                <p14:modId xmlns:p14="http://schemas.microsoft.com/office/powerpoint/2010/main" val="3914624968"/>
               </p:ext>
             </p:extLst>
           </p:nvPr>
         </p:nvGraphicFramePr>
         <p:xfrm>
-          <a:off x="838200" y="1825625"/>
-          <a:ext cx="10515600" cy="3137939"/>
+          <a:off x="670560" y="1187615"/>
+          <a:ext cx="10850882" cy="2241385"/>
         </p:xfrm>
         <a:graphic>
           <a:graphicData uri="http://schemas.openxmlformats.org/drawingml/2006/table">
@@ -4786,28 +5448,28 @@
                 <a:tableStyleId>{5C22544A-7EE6-4342-B048-85BDC9FD1C3A}</a:tableStyleId>
               </a:tblPr>
               <a:tblGrid>
-                <a:gridCol w="1631731">
+                <a:gridCol w="1683757">
                   <a:extLst>
                     <a:ext uri="{9D8B030D-6E8A-4147-A177-3AD203B41FA5}">
                       <a16:colId xmlns:a16="http://schemas.microsoft.com/office/drawing/2014/main" val="44924583"/>
                     </a:ext>
                   </a:extLst>
                 </a:gridCol>
-                <a:gridCol w="1786759">
+                <a:gridCol w="1843729">
                   <a:extLst>
                     <a:ext uri="{9D8B030D-6E8A-4147-A177-3AD203B41FA5}">
                       <a16:colId xmlns:a16="http://schemas.microsoft.com/office/drawing/2014/main" val="927739461"/>
                     </a:ext>
                   </a:extLst>
                 </a:gridCol>
-                <a:gridCol w="1996965">
+                <a:gridCol w="2060637">
                   <a:extLst>
                     <a:ext uri="{9D8B030D-6E8A-4147-A177-3AD203B41FA5}">
                       <a16:colId xmlns:a16="http://schemas.microsoft.com/office/drawing/2014/main" val="3821502448"/>
                     </a:ext>
                   </a:extLst>
                 </a:gridCol>
-                <a:gridCol w="5100145">
+                <a:gridCol w="5262759">
                   <a:extLst>
                     <a:ext uri="{9D8B030D-6E8A-4147-A177-3AD203B41FA5}">
                       <a16:colId xmlns:a16="http://schemas.microsoft.com/office/drawing/2014/main" val="4134990429"/>
@@ -4993,7 +5655,10 @@
                     <a:bodyPr/>
                     <a:lstStyle/>
                     <a:p>
-                      <a:endParaRPr lang="en-US" dirty="0"/>
+                      <a:r>
+                        <a:rPr lang="en-US" dirty="0"/>
+                        <a:t>Extract specific sequences from ref genome</a:t>
+                      </a:r>
                     </a:p>
                   </a:txBody>
                   <a:tcPr/>
@@ -5010,6 +5675,14 @@
                     <a:bodyPr/>
                     <a:lstStyle/>
                     <a:p>
+                      <a:r>
+                        <a:rPr lang="en-US" dirty="0"/>
+                        <a:t>.</a:t>
+                      </a:r>
+                      <a:r>
+                        <a:rPr lang="en-US" dirty="0" err="1"/>
+                        <a:t>vcf</a:t>
+                      </a:r>
                       <a:endParaRPr lang="en-US" dirty="0"/>
                     </a:p>
                   </a:txBody>
@@ -5020,6 +5693,10 @@
                     <a:bodyPr/>
                     <a:lstStyle/>
                     <a:p>
+                      <a:r>
+                        <a:rPr lang="en-US" dirty="0" err="1"/>
+                        <a:t>vcf.gz.tbi</a:t>
+                      </a:r>
                       <a:endParaRPr lang="en-US" dirty="0"/>
                     </a:p>
                   </a:txBody>
@@ -5030,6 +5707,18 @@
                     <a:bodyPr/>
                     <a:lstStyle/>
                     <a:p>
+                      <a:r>
+                        <a:rPr lang="en-US" dirty="0" err="1"/>
+                        <a:t>bgzip</a:t>
+                      </a:r>
+                      <a:r>
+                        <a:rPr lang="en-US" dirty="0"/>
+                        <a:t>/</a:t>
+                      </a:r>
+                      <a:r>
+                        <a:rPr lang="en-US" dirty="0" err="1"/>
+                        <a:t>tabix</a:t>
+                      </a:r>
                       <a:endParaRPr lang="en-US" dirty="0"/>
                     </a:p>
                   </a:txBody>
@@ -5040,7 +5729,10 @@
                     <a:bodyPr/>
                     <a:lstStyle/>
                     <a:p>
-                      <a:endParaRPr lang="en-US" dirty="0"/>
+                      <a:r>
+                        <a:rPr lang="en-US" dirty="0"/>
+                        <a:t>Pull out specific variants</a:t>
+                      </a:r>
                     </a:p>
                   </a:txBody>
                   <a:tcPr/>
@@ -5057,6 +5749,27 @@
                     <a:bodyPr/>
                     <a:lstStyle/>
                     <a:p>
+                      <a:r>
+                        <a:rPr lang="en-US" dirty="0"/>
+                        <a:t>.bed</a:t>
+                      </a:r>
+                    </a:p>
+                  </a:txBody>
+                  <a:tcPr/>
+                </a:tc>
+                <a:tc>
+                  <a:txBody>
+                    <a:bodyPr/>
+                    <a:lstStyle/>
+                    <a:p>
+                      <a:r>
+                        <a:rPr lang="en-US" dirty="0"/>
+                        <a:t>.</a:t>
+                      </a:r>
+                      <a:r>
+                        <a:rPr lang="en-US" dirty="0" err="1"/>
+                        <a:t>bed.gz.tbi</a:t>
+                      </a:r>
                       <a:endParaRPr lang="en-US" dirty="0"/>
                     </a:p>
                   </a:txBody>
@@ -5067,6 +5780,35 @@
                     <a:bodyPr/>
                     <a:lstStyle/>
                     <a:p>
+                      <a:pPr marL="0" marR="0" lvl="0" indent="0" algn="l" defTabSz="914400" rtl="0" eaLnBrk="1" fontAlgn="auto" latinLnBrk="0" hangingPunct="1">
+                        <a:lnSpc>
+                          <a:spcPct val="100000"/>
+                        </a:lnSpc>
+                        <a:spcBef>
+                          <a:spcPts val="0"/>
+                        </a:spcBef>
+                        <a:spcAft>
+                          <a:spcPts val="0"/>
+                        </a:spcAft>
+                        <a:buClrTx/>
+                        <a:buSzTx/>
+                        <a:buFontTx/>
+                        <a:buNone/>
+                        <a:tabLst/>
+                        <a:defRPr/>
+                      </a:pPr>
+                      <a:r>
+                        <a:rPr lang="en-US" dirty="0" err="1"/>
+                        <a:t>bgzip</a:t>
+                      </a:r>
+                      <a:r>
+                        <a:rPr lang="en-US" dirty="0"/>
+                        <a:t>/</a:t>
+                      </a:r>
+                      <a:r>
+                        <a:rPr lang="en-US" dirty="0" err="1"/>
+                        <a:t>tabix</a:t>
+                      </a:r>
                       <a:endParaRPr lang="en-US" dirty="0"/>
                     </a:p>
                   </a:txBody>
@@ -5077,17 +5819,10 @@
                     <a:bodyPr/>
                     <a:lstStyle/>
                     <a:p>
-                      <a:endParaRPr lang="en-US" dirty="0"/>
-                    </a:p>
-                  </a:txBody>
-                  <a:tcPr/>
-                </a:tc>
-                <a:tc>
-                  <a:txBody>
-                    <a:bodyPr/>
-                    <a:lstStyle/>
-                    <a:p>
-                      <a:endParaRPr lang="en-US" dirty="0"/>
+                      <a:r>
+                        <a:rPr lang="en-US" dirty="0"/>
+                        <a:t>extract specific genomic regions</a:t>
+                      </a:r>
                     </a:p>
                   </a:txBody>
                   <a:tcPr/>
@@ -5095,100 +5830,6 @@
                 <a:extLst>
                   <a:ext uri="{0D108BD9-81ED-4DB2-BD59-A6C34878D82A}">
                     <a16:rowId xmlns:a16="http://schemas.microsoft.com/office/drawing/2014/main" val="298293462"/>
-                  </a:ext>
-                </a:extLst>
-              </a:tr>
-              <a:tr h="448277">
-                <a:tc>
-                  <a:txBody>
-                    <a:bodyPr/>
-                    <a:lstStyle/>
-                    <a:p>
-                      <a:endParaRPr lang="en-US" dirty="0"/>
-                    </a:p>
-                  </a:txBody>
-                  <a:tcPr/>
-                </a:tc>
-                <a:tc>
-                  <a:txBody>
-                    <a:bodyPr/>
-                    <a:lstStyle/>
-                    <a:p>
-                      <a:endParaRPr lang="en-US" dirty="0"/>
-                    </a:p>
-                  </a:txBody>
-                  <a:tcPr/>
-                </a:tc>
-                <a:tc>
-                  <a:txBody>
-                    <a:bodyPr/>
-                    <a:lstStyle/>
-                    <a:p>
-                      <a:endParaRPr lang="en-US" dirty="0"/>
-                    </a:p>
-                  </a:txBody>
-                  <a:tcPr/>
-                </a:tc>
-                <a:tc>
-                  <a:txBody>
-                    <a:bodyPr/>
-                    <a:lstStyle/>
-                    <a:p>
-                      <a:endParaRPr lang="en-US" dirty="0"/>
-                    </a:p>
-                  </a:txBody>
-                  <a:tcPr/>
-                </a:tc>
-                <a:extLst>
-                  <a:ext uri="{0D108BD9-81ED-4DB2-BD59-A6C34878D82A}">
-                    <a16:rowId xmlns:a16="http://schemas.microsoft.com/office/drawing/2014/main" val="3470727191"/>
-                  </a:ext>
-                </a:extLst>
-              </a:tr>
-              <a:tr h="448277">
-                <a:tc>
-                  <a:txBody>
-                    <a:bodyPr/>
-                    <a:lstStyle/>
-                    <a:p>
-                      <a:endParaRPr lang="en-US" dirty="0"/>
-                    </a:p>
-                  </a:txBody>
-                  <a:tcPr/>
-                </a:tc>
-                <a:tc>
-                  <a:txBody>
-                    <a:bodyPr/>
-                    <a:lstStyle/>
-                    <a:p>
-                      <a:endParaRPr lang="en-US" dirty="0"/>
-                    </a:p>
-                  </a:txBody>
-                  <a:tcPr/>
-                </a:tc>
-                <a:tc>
-                  <a:txBody>
-                    <a:bodyPr/>
-                    <a:lstStyle/>
-                    <a:p>
-                      <a:endParaRPr lang="en-US" dirty="0"/>
-                    </a:p>
-                  </a:txBody>
-                  <a:tcPr/>
-                </a:tc>
-                <a:tc>
-                  <a:txBody>
-                    <a:bodyPr/>
-                    <a:lstStyle/>
-                    <a:p>
-                      <a:endParaRPr lang="en-US" dirty="0"/>
-                    </a:p>
-                  </a:txBody>
-                  <a:tcPr/>
-                </a:tc>
-                <a:extLst>
-                  <a:ext uri="{0D108BD9-81ED-4DB2-BD59-A6C34878D82A}">
-                    <a16:rowId xmlns:a16="http://schemas.microsoft.com/office/drawing/2014/main" val="1365833431"/>
                   </a:ext>
                 </a:extLst>
               </a:tr>
@@ -5200,6 +5841,127 @@
     <p:extLst>
       <p:ext uri="{BB962C8B-B14F-4D97-AF65-F5344CB8AC3E}">
         <p14:creationId xmlns:p14="http://schemas.microsoft.com/office/powerpoint/2010/main" val="46773329"/>
+      </p:ext>
+    </p:extLst>
+  </p:cSld>
+  <p:clrMapOvr>
+    <a:masterClrMapping/>
+  </p:clrMapOvr>
+</p:sld>
+</file>
+
+<file path=ppt/slides/slide6.xml><?xml version="1.0" encoding="utf-8"?>
+<p:sld xmlns:a="http://schemas.openxmlformats.org/drawingml/2006/main" xmlns:r="http://schemas.openxmlformats.org/officeDocument/2006/relationships" xmlns:p="http://schemas.openxmlformats.org/presentationml/2006/main">
+  <p:cSld>
+    <p:spTree>
+      <p:nvGrpSpPr>
+        <p:cNvPr id="1" name=""/>
+        <p:cNvGrpSpPr/>
+        <p:nvPr/>
+      </p:nvGrpSpPr>
+      <p:grpSpPr>
+        <a:xfrm>
+          <a:off x="0" y="0"/>
+          <a:ext cx="0" cy="0"/>
+          <a:chOff x="0" y="0"/>
+          <a:chExt cx="0" cy="0"/>
+        </a:xfrm>
+      </p:grpSpPr>
+      <p:sp>
+        <p:nvSpPr>
+          <p:cNvPr id="2" name="Title 1">
+            <a:extLst>
+              <a:ext uri="{FF2B5EF4-FFF2-40B4-BE49-F238E27FC236}">
+                <a16:creationId xmlns:a16="http://schemas.microsoft.com/office/drawing/2014/main" id="{02BF5CD1-D1CD-EC4E-BC30-B25D3CB8C977}"/>
+              </a:ext>
+            </a:extLst>
+          </p:cNvPr>
+          <p:cNvSpPr>
+            <a:spLocks noGrp="1"/>
+          </p:cNvSpPr>
+          <p:nvPr>
+            <p:ph type="title"/>
+          </p:nvPr>
+        </p:nvSpPr>
+        <p:spPr>
+          <a:xfrm>
+            <a:off x="838200" y="102366"/>
+            <a:ext cx="10515600" cy="780503"/>
+          </a:xfrm>
+        </p:spPr>
+        <p:txBody>
+          <a:bodyPr>
+            <a:normAutofit/>
+          </a:bodyPr>
+          <a:lstStyle/>
+          <a:p>
+            <a:r>
+              <a:rPr lang="en-US" sz="4000" dirty="0">
+                <a:latin typeface="Calibri" panose="020F0502020204030204" pitchFamily="34" charset="0"/>
+                <a:cs typeface="Calibri" panose="020F0502020204030204" pitchFamily="34" charset="0"/>
+              </a:rPr>
+              <a:t>Indexing is also essential for alignment</a:t>
+            </a:r>
+          </a:p>
+        </p:txBody>
+      </p:sp>
+      <p:sp>
+        <p:nvSpPr>
+          <p:cNvPr id="3" name="Content Placeholder 2">
+            <a:extLst>
+              <a:ext uri="{FF2B5EF4-FFF2-40B4-BE49-F238E27FC236}">
+                <a16:creationId xmlns:a16="http://schemas.microsoft.com/office/drawing/2014/main" id="{38FC07D5-B6CF-AF47-8871-5111BE13BD39}"/>
+              </a:ext>
+            </a:extLst>
+          </p:cNvPr>
+          <p:cNvSpPr>
+            <a:spLocks noGrp="1"/>
+          </p:cNvSpPr>
+          <p:nvPr>
+            <p:ph idx="1"/>
+          </p:nvPr>
+        </p:nvSpPr>
+        <p:spPr>
+          <a:xfrm>
+            <a:off x="838200" y="956441"/>
+            <a:ext cx="10515600" cy="5220522"/>
+          </a:xfrm>
+        </p:spPr>
+        <p:txBody>
+          <a:bodyPr>
+            <a:normAutofit/>
+          </a:bodyPr>
+          <a:lstStyle/>
+          <a:p>
+            <a:r>
+              <a:rPr lang="en-US" dirty="0">
+                <a:latin typeface="Calibri" panose="020F0502020204030204" pitchFamily="34" charset="0"/>
+                <a:cs typeface="Calibri" panose="020F0502020204030204" pitchFamily="34" charset="0"/>
+              </a:rPr>
+              <a:t>Finding out where to place a read in the genome is impractical unless matches can be quickly found</a:t>
+            </a:r>
+          </a:p>
+          <a:p>
+            <a:endParaRPr lang="en-US" dirty="0">
+              <a:latin typeface="Calibri" panose="020F0502020204030204" pitchFamily="34" charset="0"/>
+              <a:cs typeface="Calibri" panose="020F0502020204030204" pitchFamily="34" charset="0"/>
+            </a:endParaRPr>
+          </a:p>
+          <a:p>
+            <a:r>
+              <a:rPr lang="en-US" dirty="0">
+                <a:latin typeface="Calibri" panose="020F0502020204030204" pitchFamily="34" charset="0"/>
+                <a:cs typeface="Calibri" panose="020F0502020204030204" pitchFamily="34" charset="0"/>
+              </a:rPr>
+              <a:t>…</a:t>
+            </a:r>
+          </a:p>
+        </p:txBody>
+      </p:sp>
+    </p:spTree>
+    <p:extLst>
+      <p:ext uri="{BB962C8B-B14F-4D97-AF65-F5344CB8AC3E}">
+        <p14:creationId xmlns:p14="http://schemas.microsoft.com/office/powerpoint/2010/main" val="2829928138"/>
       </p:ext>
     </p:extLst>
   </p:cSld>

</xml_diff>